<commit_message>
Powerpoint nog iets aangepast...
</commit_message>
<xml_diff>
--- a/Documentatie/Presentatie/Presentatie.pptx
+++ b/Documentatie/Presentatie/Presentatie.pptx
@@ -353,6 +353,18 @@
   <p:clrMapOvr>
     <a:masterClrMapping/>
   </p:clrMapOvr>
+  <mc:AlternateContent xmlns:mc="http://schemas.openxmlformats.org/markup-compatibility/2006">
+    <mc:Choice xmlns:p14="http://schemas.microsoft.com/office/powerpoint/2010/main" Requires="p14">
+      <p:transition spd="slow" p14:dur="800">
+        <p14:flythrough/>
+      </p:transition>
+    </mc:Choice>
+    <mc:Fallback>
+      <p:transition spd="slow">
+        <p:fade/>
+      </p:transition>
+    </mc:Fallback>
+  </mc:AlternateContent>
 </p:sldLayout>
 </file>
 
@@ -523,6 +535,18 @@
   <p:clrMapOvr>
     <a:masterClrMapping/>
   </p:clrMapOvr>
+  <mc:AlternateContent xmlns:mc="http://schemas.openxmlformats.org/markup-compatibility/2006">
+    <mc:Choice xmlns:p14="http://schemas.microsoft.com/office/powerpoint/2010/main" Requires="p14">
+      <p:transition spd="slow" p14:dur="800">
+        <p14:flythrough/>
+      </p:transition>
+    </mc:Choice>
+    <mc:Fallback>
+      <p:transition spd="slow">
+        <p:fade/>
+      </p:transition>
+    </mc:Fallback>
+  </mc:AlternateContent>
 </p:sldLayout>
 </file>
 
@@ -703,6 +727,18 @@
   <p:clrMapOvr>
     <a:masterClrMapping/>
   </p:clrMapOvr>
+  <mc:AlternateContent xmlns:mc="http://schemas.openxmlformats.org/markup-compatibility/2006">
+    <mc:Choice xmlns:p14="http://schemas.microsoft.com/office/powerpoint/2010/main" Requires="p14">
+      <p:transition spd="slow" p14:dur="800">
+        <p14:flythrough/>
+      </p:transition>
+    </mc:Choice>
+    <mc:Fallback>
+      <p:transition spd="slow">
+        <p:fade/>
+      </p:transition>
+    </mc:Fallback>
+  </mc:AlternateContent>
 </p:sldLayout>
 </file>
 
@@ -873,6 +909,18 @@
   <p:clrMapOvr>
     <a:masterClrMapping/>
   </p:clrMapOvr>
+  <mc:AlternateContent xmlns:mc="http://schemas.openxmlformats.org/markup-compatibility/2006">
+    <mc:Choice xmlns:p14="http://schemas.microsoft.com/office/powerpoint/2010/main" Requires="p14">
+      <p:transition spd="slow" p14:dur="800">
+        <p14:flythrough/>
+      </p:transition>
+    </mc:Choice>
+    <mc:Fallback>
+      <p:transition spd="slow">
+        <p:fade/>
+      </p:transition>
+    </mc:Fallback>
+  </mc:AlternateContent>
 </p:sldLayout>
 </file>
 
@@ -1119,6 +1167,18 @@
   <p:clrMapOvr>
     <a:masterClrMapping/>
   </p:clrMapOvr>
+  <mc:AlternateContent xmlns:mc="http://schemas.openxmlformats.org/markup-compatibility/2006">
+    <mc:Choice xmlns:p14="http://schemas.microsoft.com/office/powerpoint/2010/main" Requires="p14">
+      <p:transition spd="slow" p14:dur="800">
+        <p14:flythrough/>
+      </p:transition>
+    </mc:Choice>
+    <mc:Fallback>
+      <p:transition spd="slow">
+        <p:fade/>
+      </p:transition>
+    </mc:Fallback>
+  </mc:AlternateContent>
 </p:sldLayout>
 </file>
 
@@ -1407,6 +1467,18 @@
   <p:clrMapOvr>
     <a:masterClrMapping/>
   </p:clrMapOvr>
+  <mc:AlternateContent xmlns:mc="http://schemas.openxmlformats.org/markup-compatibility/2006">
+    <mc:Choice xmlns:p14="http://schemas.microsoft.com/office/powerpoint/2010/main" Requires="p14">
+      <p:transition spd="slow" p14:dur="800">
+        <p14:flythrough/>
+      </p:transition>
+    </mc:Choice>
+    <mc:Fallback>
+      <p:transition spd="slow">
+        <p:fade/>
+      </p:transition>
+    </mc:Fallback>
+  </mc:AlternateContent>
 </p:sldLayout>
 </file>
 
@@ -1829,6 +1901,18 @@
   <p:clrMapOvr>
     <a:masterClrMapping/>
   </p:clrMapOvr>
+  <mc:AlternateContent xmlns:mc="http://schemas.openxmlformats.org/markup-compatibility/2006">
+    <mc:Choice xmlns:p14="http://schemas.microsoft.com/office/powerpoint/2010/main" Requires="p14">
+      <p:transition spd="slow" p14:dur="800">
+        <p14:flythrough/>
+      </p:transition>
+    </mc:Choice>
+    <mc:Fallback>
+      <p:transition spd="slow">
+        <p:fade/>
+      </p:transition>
+    </mc:Fallback>
+  </mc:AlternateContent>
 </p:sldLayout>
 </file>
 
@@ -1947,6 +2031,18 @@
   <p:clrMapOvr>
     <a:masterClrMapping/>
   </p:clrMapOvr>
+  <mc:AlternateContent xmlns:mc="http://schemas.openxmlformats.org/markup-compatibility/2006">
+    <mc:Choice xmlns:p14="http://schemas.microsoft.com/office/powerpoint/2010/main" Requires="p14">
+      <p:transition spd="slow" p14:dur="800">
+        <p14:flythrough/>
+      </p:transition>
+    </mc:Choice>
+    <mc:Fallback>
+      <p:transition spd="slow">
+        <p:fade/>
+      </p:transition>
+    </mc:Fallback>
+  </mc:AlternateContent>
 </p:sldLayout>
 </file>
 
@@ -2042,6 +2138,18 @@
   <p:clrMapOvr>
     <a:masterClrMapping/>
   </p:clrMapOvr>
+  <mc:AlternateContent xmlns:mc="http://schemas.openxmlformats.org/markup-compatibility/2006">
+    <mc:Choice xmlns:p14="http://schemas.microsoft.com/office/powerpoint/2010/main" Requires="p14">
+      <p:transition spd="slow" p14:dur="800">
+        <p14:flythrough/>
+      </p:transition>
+    </mc:Choice>
+    <mc:Fallback>
+      <p:transition spd="slow">
+        <p:fade/>
+      </p:transition>
+    </mc:Fallback>
+  </mc:AlternateContent>
 </p:sldLayout>
 </file>
 
@@ -2319,6 +2427,18 @@
   <p:clrMapOvr>
     <a:masterClrMapping/>
   </p:clrMapOvr>
+  <mc:AlternateContent xmlns:mc="http://schemas.openxmlformats.org/markup-compatibility/2006">
+    <mc:Choice xmlns:p14="http://schemas.microsoft.com/office/powerpoint/2010/main" Requires="p14">
+      <p:transition spd="slow" p14:dur="800">
+        <p14:flythrough/>
+      </p:transition>
+    </mc:Choice>
+    <mc:Fallback>
+      <p:transition spd="slow">
+        <p:fade/>
+      </p:transition>
+    </mc:Fallback>
+  </mc:AlternateContent>
 </p:sldLayout>
 </file>
 
@@ -2572,6 +2692,18 @@
   <p:clrMapOvr>
     <a:masterClrMapping/>
   </p:clrMapOvr>
+  <mc:AlternateContent xmlns:mc="http://schemas.openxmlformats.org/markup-compatibility/2006">
+    <mc:Choice xmlns:p14="http://schemas.microsoft.com/office/powerpoint/2010/main" Requires="p14">
+      <p:transition spd="slow" p14:dur="800">
+        <p14:flythrough/>
+      </p:transition>
+    </mc:Choice>
+    <mc:Fallback>
+      <p:transition spd="slow">
+        <p:fade/>
+      </p:transition>
+    </mc:Fallback>
+  </mc:AlternateContent>
 </p:sldLayout>
 </file>
 
@@ -2832,6 +2964,18 @@
     <p:sldLayoutId id="2147483658" r:id="rId10"/>
     <p:sldLayoutId id="2147483659" r:id="rId11"/>
   </p:sldLayoutIdLst>
+  <mc:AlternateContent xmlns:mc="http://schemas.openxmlformats.org/markup-compatibility/2006">
+    <mc:Choice xmlns:p14="http://schemas.microsoft.com/office/powerpoint/2010/main" Requires="p14">
+      <p:transition spd="slow" p14:dur="800">
+        <p14:flythrough/>
+      </p:transition>
+    </mc:Choice>
+    <mc:Fallback>
+      <p:transition spd="slow">
+        <p:fade/>
+      </p:transition>
+    </mc:Fallback>
+  </mc:AlternateContent>
   <p:txStyles>
     <p:titleStyle>
       <a:lvl1pPr algn="ctr" defTabSz="914400" rtl="0" eaLnBrk="1" latinLnBrk="0" hangingPunct="1">
@@ -3179,6 +3323,18 @@
   <p:clrMapOvr>
     <a:masterClrMapping/>
   </p:clrMapOvr>
+  <mc:AlternateContent xmlns:mc="http://schemas.openxmlformats.org/markup-compatibility/2006">
+    <mc:Choice xmlns:p14="http://schemas.microsoft.com/office/powerpoint/2010/main" Requires="p14">
+      <p:transition spd="slow" p14:dur="800">
+        <p14:flythrough/>
+      </p:transition>
+    </mc:Choice>
+    <mc:Fallback>
+      <p:transition spd="slow">
+        <p:fade/>
+      </p:transition>
+    </mc:Fallback>
+  </mc:AlternateContent>
   <p:timing>
     <p:tnLst>
       <p:par>
@@ -3369,6 +3525,18 @@
   <p:clrMapOvr>
     <a:masterClrMapping/>
   </p:clrMapOvr>
+  <mc:AlternateContent xmlns:mc="http://schemas.openxmlformats.org/markup-compatibility/2006">
+    <mc:Choice xmlns:p14="http://schemas.microsoft.com/office/powerpoint/2010/main" Requires="p14">
+      <p:transition spd="slow" p14:dur="800">
+        <p14:flythrough/>
+      </p:transition>
+    </mc:Choice>
+    <mc:Fallback>
+      <p:transition spd="slow">
+        <p:fade/>
+      </p:transition>
+    </mc:Fallback>
+  </mc:AlternateContent>
   <p:timing>
     <p:tnLst>
       <p:par>
@@ -3555,6 +3723,18 @@
   <p:clrMapOvr>
     <a:masterClrMapping/>
   </p:clrMapOvr>
+  <mc:AlternateContent xmlns:mc="http://schemas.openxmlformats.org/markup-compatibility/2006">
+    <mc:Choice xmlns:p14="http://schemas.microsoft.com/office/powerpoint/2010/main" Requires="p14">
+      <p:transition spd="slow" p14:dur="800">
+        <p14:flythrough/>
+      </p:transition>
+    </mc:Choice>
+    <mc:Fallback>
+      <p:transition spd="slow">
+        <p:fade/>
+      </p:transition>
+    </mc:Fallback>
+  </mc:AlternateContent>
   <p:timing>
     <p:tnLst>
       <p:par>
@@ -3646,6 +3826,18 @@
   <p:clrMapOvr>
     <a:masterClrMapping/>
   </p:clrMapOvr>
+  <mc:AlternateContent xmlns:mc="http://schemas.openxmlformats.org/markup-compatibility/2006">
+    <mc:Choice xmlns:p14="http://schemas.microsoft.com/office/powerpoint/2010/main" Requires="p14">
+      <p:transition spd="slow" p14:dur="800">
+        <p14:flythrough/>
+      </p:transition>
+    </mc:Choice>
+    <mc:Fallback>
+      <p:transition spd="slow">
+        <p:fade/>
+      </p:transition>
+    </mc:Fallback>
+  </mc:AlternateContent>
   <p:timing>
     <p:tnLst>
       <p:par>
@@ -3737,6 +3929,18 @@
   <p:clrMapOvr>
     <a:masterClrMapping/>
   </p:clrMapOvr>
+  <mc:AlternateContent xmlns:mc="http://schemas.openxmlformats.org/markup-compatibility/2006">
+    <mc:Choice xmlns:p14="http://schemas.microsoft.com/office/powerpoint/2010/main" Requires="p14">
+      <p:transition spd="slow" p14:dur="800">
+        <p14:flythrough/>
+      </p:transition>
+    </mc:Choice>
+    <mc:Fallback>
+      <p:transition spd="slow">
+        <p:fade/>
+      </p:transition>
+    </mc:Fallback>
+  </mc:AlternateContent>
   <p:timing>
     <p:tnLst>
       <p:par>
@@ -3934,6 +4138,18 @@
   <p:clrMapOvr>
     <a:masterClrMapping/>
   </p:clrMapOvr>
+  <mc:AlternateContent xmlns:mc="http://schemas.openxmlformats.org/markup-compatibility/2006">
+    <mc:Choice xmlns:p14="http://schemas.microsoft.com/office/powerpoint/2010/main" Requires="p14">
+      <p:transition spd="slow" p14:dur="800">
+        <p14:flythrough/>
+      </p:transition>
+    </mc:Choice>
+    <mc:Fallback>
+      <p:transition spd="slow">
+        <p:fade/>
+      </p:transition>
+    </mc:Fallback>
+  </mc:AlternateContent>
   <p:timing>
     <p:tnLst>
       <p:par>
@@ -4107,6 +4323,18 @@
   <p:clrMapOvr>
     <a:masterClrMapping/>
   </p:clrMapOvr>
+  <mc:AlternateContent xmlns:mc="http://schemas.openxmlformats.org/markup-compatibility/2006">
+    <mc:Choice xmlns:p14="http://schemas.microsoft.com/office/powerpoint/2010/main" Requires="p14">
+      <p:transition spd="slow" p14:dur="800">
+        <p14:flythrough/>
+      </p:transition>
+    </mc:Choice>
+    <mc:Fallback>
+      <p:transition spd="slow">
+        <p:fade/>
+      </p:transition>
+    </mc:Fallback>
+  </mc:AlternateContent>
   <p:timing>
     <p:tnLst>
       <p:par>
@@ -4278,6 +4506,18 @@
   <p:clrMapOvr>
     <a:masterClrMapping/>
   </p:clrMapOvr>
+  <mc:AlternateContent xmlns:mc="http://schemas.openxmlformats.org/markup-compatibility/2006">
+    <mc:Choice xmlns:p14="http://schemas.microsoft.com/office/powerpoint/2010/main" Requires="p14">
+      <p:transition spd="slow" p14:dur="800">
+        <p14:flythrough/>
+      </p:transition>
+    </mc:Choice>
+    <mc:Fallback>
+      <p:transition spd="slow">
+        <p:fade/>
+      </p:transition>
+    </mc:Fallback>
+  </mc:AlternateContent>
   <p:timing>
     <p:tnLst>
       <p:par>

</xml_diff>

<commit_message>
PowerPoint nog iets aangepast... ('het proces' toegevoegd).
</commit_message>
<xml_diff>
--- a/Documentatie/Presentatie/Presentatie.pptx
+++ b/Documentatie/Presentatie/Presentatie.pptx
@@ -11,8 +11,10 @@
     <p:sldId id="261" r:id="rId5"/>
     <p:sldId id="262" r:id="rId6"/>
     <p:sldId id="263" r:id="rId7"/>
-    <p:sldId id="264" r:id="rId8"/>
-    <p:sldId id="266" r:id="rId9"/>
+    <p:sldId id="268" r:id="rId8"/>
+    <p:sldId id="267" r:id="rId9"/>
+    <p:sldId id="264" r:id="rId10"/>
+    <p:sldId id="266" r:id="rId11"/>
   </p:sldIdLst>
   <p:sldSz cx="9144000" cy="6858000" type="screen4x3"/>
   <p:notesSz cx="6858000" cy="9144000"/>
@@ -295,7 +297,7 @@
           <a:p>
             <a:fld id="{B8016C25-D073-47E0-B0E5-F8D4C2B3C22C}" type="datetimeFigureOut">
               <a:rPr lang="nl-NL" smtClean="0"/>
-              <a:t>18-6-2013</a:t>
+              <a:t>19-6-2013</a:t>
             </a:fld>
             <a:endParaRPr lang="nl-NL"/>
           </a:p>
@@ -353,13 +355,13 @@
   <p:clrMapOvr>
     <a:masterClrMapping/>
   </p:clrMapOvr>
-  <mc:AlternateContent xmlns:mc="http://schemas.openxmlformats.org/markup-compatibility/2006">
-    <mc:Choice xmlns:p14="http://schemas.microsoft.com/office/powerpoint/2010/main" Requires="p14">
+  <mc:AlternateContent xmlns:mc="http://schemas.openxmlformats.org/markup-compatibility/2006" xmlns:p14="http://schemas.microsoft.com/office/powerpoint/2010/main">
+    <mc:Choice Requires="p14">
       <p:transition spd="slow" p14:dur="800">
         <p14:flythrough/>
       </p:transition>
     </mc:Choice>
-    <mc:Fallback>
+    <mc:Fallback xmlns="">
       <p:transition spd="slow">
         <p:fade/>
       </p:transition>
@@ -477,7 +479,7 @@
           <a:p>
             <a:fld id="{B8016C25-D073-47E0-B0E5-F8D4C2B3C22C}" type="datetimeFigureOut">
               <a:rPr lang="nl-NL" smtClean="0"/>
-              <a:t>18-6-2013</a:t>
+              <a:t>19-6-2013</a:t>
             </a:fld>
             <a:endParaRPr lang="nl-NL"/>
           </a:p>
@@ -535,13 +537,13 @@
   <p:clrMapOvr>
     <a:masterClrMapping/>
   </p:clrMapOvr>
-  <mc:AlternateContent xmlns:mc="http://schemas.openxmlformats.org/markup-compatibility/2006">
-    <mc:Choice xmlns:p14="http://schemas.microsoft.com/office/powerpoint/2010/main" Requires="p14">
+  <mc:AlternateContent xmlns:mc="http://schemas.openxmlformats.org/markup-compatibility/2006" xmlns:p14="http://schemas.microsoft.com/office/powerpoint/2010/main">
+    <mc:Choice Requires="p14">
       <p:transition spd="slow" p14:dur="800">
         <p14:flythrough/>
       </p:transition>
     </mc:Choice>
-    <mc:Fallback>
+    <mc:Fallback xmlns="">
       <p:transition spd="slow">
         <p:fade/>
       </p:transition>
@@ -669,7 +671,7 @@
           <a:p>
             <a:fld id="{B8016C25-D073-47E0-B0E5-F8D4C2B3C22C}" type="datetimeFigureOut">
               <a:rPr lang="nl-NL" smtClean="0"/>
-              <a:t>18-6-2013</a:t>
+              <a:t>19-6-2013</a:t>
             </a:fld>
             <a:endParaRPr lang="nl-NL"/>
           </a:p>
@@ -727,13 +729,13 @@
   <p:clrMapOvr>
     <a:masterClrMapping/>
   </p:clrMapOvr>
-  <mc:AlternateContent xmlns:mc="http://schemas.openxmlformats.org/markup-compatibility/2006">
-    <mc:Choice xmlns:p14="http://schemas.microsoft.com/office/powerpoint/2010/main" Requires="p14">
+  <mc:AlternateContent xmlns:mc="http://schemas.openxmlformats.org/markup-compatibility/2006" xmlns:p14="http://schemas.microsoft.com/office/powerpoint/2010/main">
+    <mc:Choice Requires="p14">
       <p:transition spd="slow" p14:dur="800">
         <p14:flythrough/>
       </p:transition>
     </mc:Choice>
-    <mc:Fallback>
+    <mc:Fallback xmlns="">
       <p:transition spd="slow">
         <p:fade/>
       </p:transition>
@@ -851,7 +853,7 @@
           <a:p>
             <a:fld id="{B8016C25-D073-47E0-B0E5-F8D4C2B3C22C}" type="datetimeFigureOut">
               <a:rPr lang="nl-NL" smtClean="0"/>
-              <a:t>18-6-2013</a:t>
+              <a:t>19-6-2013</a:t>
             </a:fld>
             <a:endParaRPr lang="nl-NL"/>
           </a:p>
@@ -909,13 +911,13 @@
   <p:clrMapOvr>
     <a:masterClrMapping/>
   </p:clrMapOvr>
-  <mc:AlternateContent xmlns:mc="http://schemas.openxmlformats.org/markup-compatibility/2006">
-    <mc:Choice xmlns:p14="http://schemas.microsoft.com/office/powerpoint/2010/main" Requires="p14">
+  <mc:AlternateContent xmlns:mc="http://schemas.openxmlformats.org/markup-compatibility/2006" xmlns:p14="http://schemas.microsoft.com/office/powerpoint/2010/main">
+    <mc:Choice Requires="p14">
       <p:transition spd="slow" p14:dur="800">
         <p14:flythrough/>
       </p:transition>
     </mc:Choice>
-    <mc:Fallback>
+    <mc:Fallback xmlns="">
       <p:transition spd="slow">
         <p:fade/>
       </p:transition>
@@ -1109,7 +1111,7 @@
           <a:p>
             <a:fld id="{B8016C25-D073-47E0-B0E5-F8D4C2B3C22C}" type="datetimeFigureOut">
               <a:rPr lang="nl-NL" smtClean="0"/>
-              <a:t>18-6-2013</a:t>
+              <a:t>19-6-2013</a:t>
             </a:fld>
             <a:endParaRPr lang="nl-NL"/>
           </a:p>
@@ -1167,13 +1169,13 @@
   <p:clrMapOvr>
     <a:masterClrMapping/>
   </p:clrMapOvr>
-  <mc:AlternateContent xmlns:mc="http://schemas.openxmlformats.org/markup-compatibility/2006">
-    <mc:Choice xmlns:p14="http://schemas.microsoft.com/office/powerpoint/2010/main" Requires="p14">
+  <mc:AlternateContent xmlns:mc="http://schemas.openxmlformats.org/markup-compatibility/2006" xmlns:p14="http://schemas.microsoft.com/office/powerpoint/2010/main">
+    <mc:Choice Requires="p14">
       <p:transition spd="slow" p14:dur="800">
         <p14:flythrough/>
       </p:transition>
     </mc:Choice>
-    <mc:Fallback>
+    <mc:Fallback xmlns="">
       <p:transition spd="slow">
         <p:fade/>
       </p:transition>
@@ -1409,7 +1411,7 @@
           <a:p>
             <a:fld id="{B8016C25-D073-47E0-B0E5-F8D4C2B3C22C}" type="datetimeFigureOut">
               <a:rPr lang="nl-NL" smtClean="0"/>
-              <a:t>18-6-2013</a:t>
+              <a:t>19-6-2013</a:t>
             </a:fld>
             <a:endParaRPr lang="nl-NL"/>
           </a:p>
@@ -1467,13 +1469,13 @@
   <p:clrMapOvr>
     <a:masterClrMapping/>
   </p:clrMapOvr>
-  <mc:AlternateContent xmlns:mc="http://schemas.openxmlformats.org/markup-compatibility/2006">
-    <mc:Choice xmlns:p14="http://schemas.microsoft.com/office/powerpoint/2010/main" Requires="p14">
+  <mc:AlternateContent xmlns:mc="http://schemas.openxmlformats.org/markup-compatibility/2006" xmlns:p14="http://schemas.microsoft.com/office/powerpoint/2010/main">
+    <mc:Choice Requires="p14">
       <p:transition spd="slow" p14:dur="800">
         <p14:flythrough/>
       </p:transition>
     </mc:Choice>
-    <mc:Fallback>
+    <mc:Fallback xmlns="">
       <p:transition spd="slow">
         <p:fade/>
       </p:transition>
@@ -1843,7 +1845,7 @@
           <a:p>
             <a:fld id="{B8016C25-D073-47E0-B0E5-F8D4C2B3C22C}" type="datetimeFigureOut">
               <a:rPr lang="nl-NL" smtClean="0"/>
-              <a:t>18-6-2013</a:t>
+              <a:t>19-6-2013</a:t>
             </a:fld>
             <a:endParaRPr lang="nl-NL"/>
           </a:p>
@@ -1901,13 +1903,13 @@
   <p:clrMapOvr>
     <a:masterClrMapping/>
   </p:clrMapOvr>
-  <mc:AlternateContent xmlns:mc="http://schemas.openxmlformats.org/markup-compatibility/2006">
-    <mc:Choice xmlns:p14="http://schemas.microsoft.com/office/powerpoint/2010/main" Requires="p14">
+  <mc:AlternateContent xmlns:mc="http://schemas.openxmlformats.org/markup-compatibility/2006" xmlns:p14="http://schemas.microsoft.com/office/powerpoint/2010/main">
+    <mc:Choice Requires="p14">
       <p:transition spd="slow" p14:dur="800">
         <p14:flythrough/>
       </p:transition>
     </mc:Choice>
-    <mc:Fallback>
+    <mc:Fallback xmlns="">
       <p:transition spd="slow">
         <p:fade/>
       </p:transition>
@@ -1973,7 +1975,7 @@
           <a:p>
             <a:fld id="{B8016C25-D073-47E0-B0E5-F8D4C2B3C22C}" type="datetimeFigureOut">
               <a:rPr lang="nl-NL" smtClean="0"/>
-              <a:t>18-6-2013</a:t>
+              <a:t>19-6-2013</a:t>
             </a:fld>
             <a:endParaRPr lang="nl-NL"/>
           </a:p>
@@ -2031,13 +2033,13 @@
   <p:clrMapOvr>
     <a:masterClrMapping/>
   </p:clrMapOvr>
-  <mc:AlternateContent xmlns:mc="http://schemas.openxmlformats.org/markup-compatibility/2006">
-    <mc:Choice xmlns:p14="http://schemas.microsoft.com/office/powerpoint/2010/main" Requires="p14">
+  <mc:AlternateContent xmlns:mc="http://schemas.openxmlformats.org/markup-compatibility/2006" xmlns:p14="http://schemas.microsoft.com/office/powerpoint/2010/main">
+    <mc:Choice Requires="p14">
       <p:transition spd="slow" p14:dur="800">
         <p14:flythrough/>
       </p:transition>
     </mc:Choice>
-    <mc:Fallback>
+    <mc:Fallback xmlns="">
       <p:transition spd="slow">
         <p:fade/>
       </p:transition>
@@ -2080,7 +2082,7 @@
           <a:p>
             <a:fld id="{B8016C25-D073-47E0-B0E5-F8D4C2B3C22C}" type="datetimeFigureOut">
               <a:rPr lang="nl-NL" smtClean="0"/>
-              <a:t>18-6-2013</a:t>
+              <a:t>19-6-2013</a:t>
             </a:fld>
             <a:endParaRPr lang="nl-NL"/>
           </a:p>
@@ -2138,13 +2140,13 @@
   <p:clrMapOvr>
     <a:masterClrMapping/>
   </p:clrMapOvr>
-  <mc:AlternateContent xmlns:mc="http://schemas.openxmlformats.org/markup-compatibility/2006">
-    <mc:Choice xmlns:p14="http://schemas.microsoft.com/office/powerpoint/2010/main" Requires="p14">
+  <mc:AlternateContent xmlns:mc="http://schemas.openxmlformats.org/markup-compatibility/2006" xmlns:p14="http://schemas.microsoft.com/office/powerpoint/2010/main">
+    <mc:Choice Requires="p14">
       <p:transition spd="slow" p14:dur="800">
         <p14:flythrough/>
       </p:transition>
     </mc:Choice>
-    <mc:Fallback>
+    <mc:Fallback xmlns="">
       <p:transition spd="slow">
         <p:fade/>
       </p:transition>
@@ -2369,7 +2371,7 @@
           <a:p>
             <a:fld id="{B8016C25-D073-47E0-B0E5-F8D4C2B3C22C}" type="datetimeFigureOut">
               <a:rPr lang="nl-NL" smtClean="0"/>
-              <a:t>18-6-2013</a:t>
+              <a:t>19-6-2013</a:t>
             </a:fld>
             <a:endParaRPr lang="nl-NL"/>
           </a:p>
@@ -2427,13 +2429,13 @@
   <p:clrMapOvr>
     <a:masterClrMapping/>
   </p:clrMapOvr>
-  <mc:AlternateContent xmlns:mc="http://schemas.openxmlformats.org/markup-compatibility/2006">
-    <mc:Choice xmlns:p14="http://schemas.microsoft.com/office/powerpoint/2010/main" Requires="p14">
+  <mc:AlternateContent xmlns:mc="http://schemas.openxmlformats.org/markup-compatibility/2006" xmlns:p14="http://schemas.microsoft.com/office/powerpoint/2010/main">
+    <mc:Choice Requires="p14">
       <p:transition spd="slow" p14:dur="800">
         <p14:flythrough/>
       </p:transition>
     </mc:Choice>
-    <mc:Fallback>
+    <mc:Fallback xmlns="">
       <p:transition spd="slow">
         <p:fade/>
       </p:transition>
@@ -2634,7 +2636,7 @@
           <a:p>
             <a:fld id="{B8016C25-D073-47E0-B0E5-F8D4C2B3C22C}" type="datetimeFigureOut">
               <a:rPr lang="nl-NL" smtClean="0"/>
-              <a:t>18-6-2013</a:t>
+              <a:t>19-6-2013</a:t>
             </a:fld>
             <a:endParaRPr lang="nl-NL"/>
           </a:p>
@@ -2692,13 +2694,13 @@
   <p:clrMapOvr>
     <a:masterClrMapping/>
   </p:clrMapOvr>
-  <mc:AlternateContent xmlns:mc="http://schemas.openxmlformats.org/markup-compatibility/2006">
-    <mc:Choice xmlns:p14="http://schemas.microsoft.com/office/powerpoint/2010/main" Requires="p14">
+  <mc:AlternateContent xmlns:mc="http://schemas.openxmlformats.org/markup-compatibility/2006" xmlns:p14="http://schemas.microsoft.com/office/powerpoint/2010/main">
+    <mc:Choice Requires="p14">
       <p:transition spd="slow" p14:dur="800">
         <p14:flythrough/>
       </p:transition>
     </mc:Choice>
-    <mc:Fallback>
+    <mc:Fallback xmlns="">
       <p:transition spd="slow">
         <p:fade/>
       </p:transition>
@@ -2859,7 +2861,7 @@
           <a:p>
             <a:fld id="{B8016C25-D073-47E0-B0E5-F8D4C2B3C22C}" type="datetimeFigureOut">
               <a:rPr lang="nl-NL" smtClean="0"/>
-              <a:t>18-6-2013</a:t>
+              <a:t>19-6-2013</a:t>
             </a:fld>
             <a:endParaRPr lang="nl-NL"/>
           </a:p>
@@ -2964,13 +2966,13 @@
     <p:sldLayoutId id="2147483658" r:id="rId10"/>
     <p:sldLayoutId id="2147483659" r:id="rId11"/>
   </p:sldLayoutIdLst>
-  <mc:AlternateContent xmlns:mc="http://schemas.openxmlformats.org/markup-compatibility/2006">
-    <mc:Choice xmlns:p14="http://schemas.microsoft.com/office/powerpoint/2010/main" Requires="p14">
+  <mc:AlternateContent xmlns:mc="http://schemas.openxmlformats.org/markup-compatibility/2006" xmlns:p14="http://schemas.microsoft.com/office/powerpoint/2010/main">
+    <mc:Choice Requires="p14">
       <p:transition spd="slow" p14:dur="800">
         <p14:flythrough/>
       </p:transition>
     </mc:Choice>
-    <mc:Fallback>
+    <mc:Fallback xmlns="">
       <p:transition spd="slow">
         <p:fade/>
       </p:transition>
@@ -3323,13 +3325,196 @@
   <p:clrMapOvr>
     <a:masterClrMapping/>
   </p:clrMapOvr>
-  <mc:AlternateContent xmlns:mc="http://schemas.openxmlformats.org/markup-compatibility/2006">
-    <mc:Choice xmlns:p14="http://schemas.microsoft.com/office/powerpoint/2010/main" Requires="p14">
+  <mc:AlternateContent xmlns:mc="http://schemas.openxmlformats.org/markup-compatibility/2006" xmlns:p14="http://schemas.microsoft.com/office/powerpoint/2010/main">
+    <mc:Choice Requires="p14">
       <p:transition spd="slow" p14:dur="800">
         <p14:flythrough/>
       </p:transition>
     </mc:Choice>
-    <mc:Fallback>
+    <mc:Fallback xmlns="">
+      <p:transition spd="slow">
+        <p:fade/>
+      </p:transition>
+    </mc:Fallback>
+  </mc:AlternateContent>
+  <p:timing>
+    <p:tnLst>
+      <p:par>
+        <p:cTn id="1" dur="indefinite" restart="never" nodeType="tmRoot"/>
+      </p:par>
+    </p:tnLst>
+  </p:timing>
+</p:sld>
+</file>
+
+<file path=ppt/slides/slide10.xml><?xml version="1.0" encoding="utf-8"?>
+<p:sld xmlns:a="http://schemas.openxmlformats.org/drawingml/2006/main" xmlns:r="http://schemas.openxmlformats.org/officeDocument/2006/relationships" xmlns:p="http://schemas.openxmlformats.org/presentationml/2006/main">
+  <p:cSld>
+    <p:spTree>
+      <p:nvGrpSpPr>
+        <p:cNvPr id="1" name=""/>
+        <p:cNvGrpSpPr/>
+        <p:nvPr/>
+      </p:nvGrpSpPr>
+      <p:grpSpPr>
+        <a:xfrm>
+          <a:off x="0" y="0"/>
+          <a:ext cx="0" cy="0"/>
+          <a:chOff x="0" y="0"/>
+          <a:chExt cx="0" cy="0"/>
+        </a:xfrm>
+      </p:grpSpPr>
+      <p:pic>
+        <p:nvPicPr>
+          <p:cNvPr id="1027" name="Picture 3"/>
+          <p:cNvPicPr>
+            <a:picLocks noChangeAspect="1" noChangeArrowheads="1"/>
+          </p:cNvPicPr>
+          <p:nvPr/>
+        </p:nvPicPr>
+        <p:blipFill>
+          <a:blip r:embed="rId2">
+            <a:extLst>
+              <a:ext uri="{28A0092B-C50C-407E-A947-70E740481C1C}">
+                <a14:useLocalDpi xmlns:a14="http://schemas.microsoft.com/office/drawing/2010/main" val="0"/>
+              </a:ext>
+            </a:extLst>
+          </a:blip>
+          <a:srcRect/>
+          <a:stretch>
+            <a:fillRect/>
+          </a:stretch>
+        </p:blipFill>
+        <p:spPr bwMode="auto">
+          <a:xfrm>
+            <a:off x="1" y="-27384"/>
+            <a:ext cx="9144000" cy="1143000"/>
+          </a:xfrm>
+          <a:prstGeom prst="rect">
+            <a:avLst/>
+          </a:prstGeom>
+          <a:noFill/>
+          <a:ln>
+            <a:noFill/>
+          </a:ln>
+          <a:extLst>
+            <a:ext uri="{909E8E84-426E-40DD-AFC4-6F175D3DCCD1}">
+              <a14:hiddenFill xmlns:a14="http://schemas.microsoft.com/office/drawing/2010/main">
+                <a:solidFill>
+                  <a:schemeClr val="accent1"/>
+                </a:solidFill>
+              </a14:hiddenFill>
+            </a:ext>
+            <a:ext uri="{91240B29-F687-4F45-9708-019B960494DF}">
+              <a14:hiddenLine xmlns:a14="http://schemas.microsoft.com/office/drawing/2010/main" w="9525">
+                <a:solidFill>
+                  <a:schemeClr val="tx1"/>
+                </a:solidFill>
+                <a:miter lim="800000"/>
+                <a:headEnd/>
+                <a:tailEnd/>
+              </a14:hiddenLine>
+            </a:ext>
+          </a:extLst>
+        </p:spPr>
+      </p:pic>
+      <p:sp>
+        <p:nvSpPr>
+          <p:cNvPr id="5" name="Tekstvak 4"/>
+          <p:cNvSpPr txBox="1"/>
+          <p:nvPr/>
+        </p:nvSpPr>
+        <p:spPr>
+          <a:xfrm>
+            <a:off x="2411760" y="476672"/>
+            <a:ext cx="4608512" cy="369332"/>
+          </a:xfrm>
+          <a:prstGeom prst="rect">
+            <a:avLst/>
+          </a:prstGeom>
+          <a:noFill/>
+        </p:spPr>
+        <p:txBody>
+          <a:bodyPr wrap="square" rtlCol="0">
+            <a:spAutoFit/>
+          </a:bodyPr>
+          <a:lstStyle/>
+          <a:p>
+            <a:pPr algn="ctr"/>
+            <a:r>
+              <a:rPr lang="nl-NL" dirty="0" smtClean="0">
+                <a:solidFill>
+                  <a:schemeClr val="bg1"/>
+                </a:solidFill>
+                <a:latin typeface="Eras Bold ITC" pitchFamily="34" charset="0"/>
+              </a:rPr>
+              <a:t>Demonstratie</a:t>
+            </a:r>
+            <a:endParaRPr lang="nl-NL" dirty="0">
+              <a:solidFill>
+                <a:schemeClr val="bg1"/>
+              </a:solidFill>
+              <a:latin typeface="Eras Bold ITC" pitchFamily="34" charset="0"/>
+            </a:endParaRPr>
+          </a:p>
+        </p:txBody>
+      </p:sp>
+      <p:sp>
+        <p:nvSpPr>
+          <p:cNvPr id="2" name="Tekstvak 1"/>
+          <p:cNvSpPr txBox="1"/>
+          <p:nvPr/>
+        </p:nvSpPr>
+        <p:spPr>
+          <a:xfrm>
+            <a:off x="1223628" y="3068960"/>
+            <a:ext cx="6984776" cy="707886"/>
+          </a:xfrm>
+          <a:prstGeom prst="rect">
+            <a:avLst/>
+          </a:prstGeom>
+          <a:noFill/>
+        </p:spPr>
+        <p:txBody>
+          <a:bodyPr wrap="square" rtlCol="0">
+            <a:spAutoFit/>
+          </a:bodyPr>
+          <a:lstStyle/>
+          <a:p>
+            <a:pPr algn="ctr"/>
+            <a:r>
+              <a:rPr lang="nl-NL" sz="4000" dirty="0">
+                <a:hlinkClick r:id="rId3"/>
+              </a:rPr>
+              <a:t>http://</a:t>
+            </a:r>
+            <a:r>
+              <a:rPr lang="nl-NL" sz="4000" dirty="0" smtClean="0">
+                <a:hlinkClick r:id="rId3"/>
+              </a:rPr>
+              <a:t>subscribeme.tech.nhl.nl</a:t>
+            </a:r>
+            <a:endParaRPr lang="nl-NL" sz="4000" dirty="0"/>
+          </a:p>
+        </p:txBody>
+      </p:sp>
+    </p:spTree>
+    <p:extLst>
+      <p:ext uri="{BB962C8B-B14F-4D97-AF65-F5344CB8AC3E}">
+        <p14:creationId xmlns:p14="http://schemas.microsoft.com/office/powerpoint/2010/main" val="4241157190"/>
+      </p:ext>
+    </p:extLst>
+  </p:cSld>
+  <p:clrMapOvr>
+    <a:masterClrMapping/>
+  </p:clrMapOvr>
+  <mc:AlternateContent xmlns:mc="http://schemas.openxmlformats.org/markup-compatibility/2006" xmlns:p14="http://schemas.microsoft.com/office/powerpoint/2010/main">
+    <mc:Choice Requires="p14">
+      <p:transition spd="slow" p14:dur="800">
+        <p14:flythrough/>
+      </p:transition>
+    </mc:Choice>
+    <mc:Fallback xmlns="">
       <p:transition spd="slow">
         <p:fade/>
       </p:transition>
@@ -3525,13 +3710,13 @@
   <p:clrMapOvr>
     <a:masterClrMapping/>
   </p:clrMapOvr>
-  <mc:AlternateContent xmlns:mc="http://schemas.openxmlformats.org/markup-compatibility/2006">
-    <mc:Choice xmlns:p14="http://schemas.microsoft.com/office/powerpoint/2010/main" Requires="p14">
+  <mc:AlternateContent xmlns:mc="http://schemas.openxmlformats.org/markup-compatibility/2006" xmlns:p14="http://schemas.microsoft.com/office/powerpoint/2010/main">
+    <mc:Choice Requires="p14">
       <p:transition spd="slow" p14:dur="800">
         <p14:flythrough/>
       </p:transition>
     </mc:Choice>
-    <mc:Fallback>
+    <mc:Fallback xmlns="">
       <p:transition spd="slow">
         <p:fade/>
       </p:transition>
@@ -3723,13 +3908,13 @@
   <p:clrMapOvr>
     <a:masterClrMapping/>
   </p:clrMapOvr>
-  <mc:AlternateContent xmlns:mc="http://schemas.openxmlformats.org/markup-compatibility/2006">
-    <mc:Choice xmlns:p14="http://schemas.microsoft.com/office/powerpoint/2010/main" Requires="p14">
+  <mc:AlternateContent xmlns:mc="http://schemas.openxmlformats.org/markup-compatibility/2006" xmlns:p14="http://schemas.microsoft.com/office/powerpoint/2010/main">
+    <mc:Choice Requires="p14">
       <p:transition spd="slow" p14:dur="800">
         <p14:flythrough/>
       </p:transition>
     </mc:Choice>
-    <mc:Fallback>
+    <mc:Fallback xmlns="">
       <p:transition spd="slow">
         <p:fade/>
       </p:transition>
@@ -3826,13 +4011,13 @@
   <p:clrMapOvr>
     <a:masterClrMapping/>
   </p:clrMapOvr>
-  <mc:AlternateContent xmlns:mc="http://schemas.openxmlformats.org/markup-compatibility/2006">
-    <mc:Choice xmlns:p14="http://schemas.microsoft.com/office/powerpoint/2010/main" Requires="p14">
+  <mc:AlternateContent xmlns:mc="http://schemas.openxmlformats.org/markup-compatibility/2006" xmlns:p14="http://schemas.microsoft.com/office/powerpoint/2010/main">
+    <mc:Choice Requires="p14">
       <p:transition spd="slow" p14:dur="800">
         <p14:flythrough/>
       </p:transition>
     </mc:Choice>
-    <mc:Fallback>
+    <mc:Fallback xmlns="">
       <p:transition spd="slow">
         <p:fade/>
       </p:transition>
@@ -3929,13 +4114,13 @@
   <p:clrMapOvr>
     <a:masterClrMapping/>
   </p:clrMapOvr>
-  <mc:AlternateContent xmlns:mc="http://schemas.openxmlformats.org/markup-compatibility/2006">
-    <mc:Choice xmlns:p14="http://schemas.microsoft.com/office/powerpoint/2010/main" Requires="p14">
+  <mc:AlternateContent xmlns:mc="http://schemas.openxmlformats.org/markup-compatibility/2006" xmlns:p14="http://schemas.microsoft.com/office/powerpoint/2010/main">
+    <mc:Choice Requires="p14">
       <p:transition spd="slow" p14:dur="800">
         <p14:flythrough/>
       </p:transition>
     </mc:Choice>
-    <mc:Fallback>
+    <mc:Fallback xmlns="">
       <p:transition spd="slow">
         <p:fade/>
       </p:transition>
@@ -3980,54 +4165,25 @@
         </p:nvSpPr>
         <p:spPr>
           <a:xfrm>
-            <a:off x="1763688" y="2492896"/>
-            <a:ext cx="5616624" cy="2736304"/>
+            <a:off x="3059832" y="2204864"/>
+            <a:ext cx="3168351" cy="1296144"/>
           </a:xfrm>
         </p:spPr>
         <p:txBody>
           <a:bodyPr>
-            <a:normAutofit fontScale="85000" lnSpcReduction="10000"/>
+            <a:normAutofit/>
           </a:bodyPr>
           <a:lstStyle/>
           <a:p>
             <a:r>
               <a:rPr lang="nl-NL" dirty="0" smtClean="0"/>
-              <a:t>PHP kennis</a:t>
-            </a:r>
-          </a:p>
-          <a:p>
-            <a:r>
-              <a:rPr lang="nl-NL" dirty="0" err="1" smtClean="0"/>
-              <a:t>Frameworks</a:t>
-            </a:r>
-            <a:endParaRPr lang="nl-NL" dirty="0" smtClean="0"/>
+              <a:t>Onderzoeksfase</a:t>
+            </a:r>
           </a:p>
           <a:p>
             <a:r>
               <a:rPr lang="nl-NL" dirty="0" smtClean="0"/>
-              <a:t>LDAP connectie</a:t>
-            </a:r>
-          </a:p>
-          <a:p>
-            <a:r>
-              <a:rPr lang="nl-NL" dirty="0" smtClean="0"/>
-              <a:t>LDAP beveiliging</a:t>
-            </a:r>
-          </a:p>
-          <a:p>
-            <a:r>
-              <a:rPr lang="nl-NL" dirty="0" smtClean="0"/>
-              <a:t>Werkplek</a:t>
-            </a:r>
-          </a:p>
-          <a:p>
-            <a:r>
-              <a:rPr lang="nl-NL" dirty="0" smtClean="0"/>
-              <a:t>Samenwerking met project </a:t>
-            </a:r>
-            <a:r>
-              <a:rPr lang="nl-NL" dirty="0" err="1" smtClean="0"/>
-              <a:t>codebox</a:t>
+              <a:t>Ontwikkelfase</a:t>
             </a:r>
             <a:endParaRPr lang="nl-NL" dirty="0" smtClean="0"/>
           </a:p>
@@ -4042,7 +4198,7 @@
           <p:nvPr/>
         </p:nvPicPr>
         <p:blipFill>
-          <a:blip r:embed="rId2">
+          <a:blip r:embed="rId3">
             <a:extLst>
               <a:ext uri="{28A0092B-C50C-407E-A947-70E740481C1C}">
                 <a14:useLocalDpi xmlns:a14="http://schemas.microsoft.com/office/drawing/2010/main" val="0"/>
@@ -4117,17 +4273,71 @@
                 </a:solidFill>
                 <a:latin typeface="Eras Bold ITC" pitchFamily="34" charset="0"/>
               </a:rPr>
-              <a:t>Problemen en oplossingen</a:t>
-            </a:r>
-            <a:endParaRPr lang="nl-NL" dirty="0">
-              <a:solidFill>
-                <a:schemeClr val="bg1"/>
-              </a:solidFill>
-              <a:latin typeface="Eras Bold ITC" pitchFamily="34" charset="0"/>
-            </a:endParaRPr>
+              <a:t>Het proces</a:t>
+            </a:r>
           </a:p>
         </p:txBody>
       </p:sp>
+      <p:graphicFrame>
+        <p:nvGraphicFramePr>
+          <p:cNvPr id="2" name="Object 1"/>
+          <p:cNvGraphicFramePr>
+            <a:graphicFrameLocks noChangeAspect="1"/>
+          </p:cNvGraphicFramePr>
+          <p:nvPr>
+            <p:extLst>
+              <p:ext uri="{D42A27DB-BD31-4B8C-83A1-F6EECF244321}">
+                <p14:modId xmlns:p14="http://schemas.microsoft.com/office/powerpoint/2010/main" val="3239911709"/>
+              </p:ext>
+            </p:extLst>
+          </p:nvPr>
+        </p:nvGraphicFramePr>
+        <p:xfrm>
+          <a:off x="2061939" y="1844824"/>
+          <a:ext cx="4886325" cy="4010025"/>
+        </p:xfrm>
+        <a:graphic>
+          <a:graphicData uri="http://schemas.openxmlformats.org/presentationml/2006/ole">
+            <mc:AlternateContent xmlns:mc="http://schemas.openxmlformats.org/markup-compatibility/2006">
+              <mc:Choice xmlns:v="urn:schemas-microsoft-com:vml" Requires="v">
+                <p:oleObj spid="_x0000_s1030" name="Werkblad" r:id="rId4" imgW="4886435" imgH="4010040" progId="Excel.Sheet.12">
+                  <p:embed/>
+                </p:oleObj>
+              </mc:Choice>
+              <mc:Fallback>
+                <p:oleObj name="Werkblad" r:id="rId4" imgW="4886435" imgH="4010040" progId="Excel.Sheet.12">
+                  <p:embed/>
+                  <p:pic>
+                    <p:nvPicPr>
+                      <p:cNvPr id="0" name=""/>
+                      <p:cNvPicPr/>
+                      <p:nvPr/>
+                    </p:nvPicPr>
+                    <p:blipFill>
+                      <a:blip r:embed="rId5"/>
+                      <a:stretch>
+                        <a:fillRect/>
+                      </a:stretch>
+                    </p:blipFill>
+                    <p:spPr>
+                      <a:xfrm>
+                        <a:off x="2061939" y="1844824"/>
+                        <a:ext cx="4886325" cy="4010025"/>
+                      </a:xfrm>
+                      <a:prstGeom prst="rect">
+                        <a:avLst/>
+                      </a:prstGeom>
+                      <a:solidFill>
+                        <a:schemeClr val="bg1"/>
+                      </a:solidFill>
+                    </p:spPr>
+                  </p:pic>
+                </p:oleObj>
+              </mc:Fallback>
+            </mc:AlternateContent>
+          </a:graphicData>
+        </a:graphic>
+      </p:graphicFrame>
     </p:spTree>
     <p:extLst>
       <p:ext uri="{BB962C8B-B14F-4D97-AF65-F5344CB8AC3E}">
@@ -4138,13 +4348,13 @@
   <p:clrMapOvr>
     <a:masterClrMapping/>
   </p:clrMapOvr>
-  <mc:AlternateContent xmlns:mc="http://schemas.openxmlformats.org/markup-compatibility/2006">
-    <mc:Choice xmlns:p14="http://schemas.microsoft.com/office/powerpoint/2010/main" Requires="p14">
+  <mc:AlternateContent xmlns:mc="http://schemas.openxmlformats.org/markup-compatibility/2006" xmlns:p14="http://schemas.microsoft.com/office/powerpoint/2010/main">
+    <mc:Choice Requires="p14">
       <p:transition spd="slow" p14:dur="800">
         <p14:flythrough/>
       </p:transition>
     </mc:Choice>
-    <mc:Fallback>
+    <mc:Fallback xmlns="">
       <p:transition spd="slow">
         <p:fade/>
       </p:transition>
@@ -4153,7 +4363,152 @@
   <p:timing>
     <p:tnLst>
       <p:par>
-        <p:cTn id="1" dur="indefinite" restart="never" nodeType="tmRoot"/>
+        <p:cTn id="1" dur="indefinite" restart="never" nodeType="tmRoot">
+          <p:childTnLst>
+            <p:seq concurrent="1" nextAc="seek">
+              <p:cTn id="2" dur="indefinite" nodeType="mainSeq">
+                <p:childTnLst>
+                  <p:par>
+                    <p:cTn id="3" fill="hold">
+                      <p:stCondLst>
+                        <p:cond delay="indefinite"/>
+                      </p:stCondLst>
+                      <p:childTnLst>
+                        <p:par>
+                          <p:cTn id="4" fill="hold">
+                            <p:stCondLst>
+                              <p:cond delay="0"/>
+                            </p:stCondLst>
+                            <p:childTnLst>
+                              <p:par>
+                                <p:cTn id="5" presetID="31" presetClass="entr" presetSubtype="0" fill="hold" nodeType="clickEffect">
+                                  <p:stCondLst>
+                                    <p:cond delay="0"/>
+                                  </p:stCondLst>
+                                  <p:childTnLst>
+                                    <p:set>
+                                      <p:cBhvr>
+                                        <p:cTn id="6" dur="1" fill="hold">
+                                          <p:stCondLst>
+                                            <p:cond delay="0"/>
+                                          </p:stCondLst>
+                                        </p:cTn>
+                                        <p:tgtEl>
+                                          <p:spTgt spid="2"/>
+                                        </p:tgtEl>
+                                        <p:attrNameLst>
+                                          <p:attrName>style.visibility</p:attrName>
+                                        </p:attrNameLst>
+                                      </p:cBhvr>
+                                      <p:to>
+                                        <p:strVal val="visible"/>
+                                      </p:to>
+                                    </p:set>
+                                    <p:anim calcmode="lin" valueType="num">
+                                      <p:cBhvr>
+                                        <p:cTn id="7" dur="1000" fill="hold"/>
+                                        <p:tgtEl>
+                                          <p:spTgt spid="2"/>
+                                        </p:tgtEl>
+                                        <p:attrNameLst>
+                                          <p:attrName>ppt_w</p:attrName>
+                                        </p:attrNameLst>
+                                      </p:cBhvr>
+                                      <p:tavLst>
+                                        <p:tav tm="0">
+                                          <p:val>
+                                            <p:fltVal val="0"/>
+                                          </p:val>
+                                        </p:tav>
+                                        <p:tav tm="100000">
+                                          <p:val>
+                                            <p:strVal val="#ppt_w"/>
+                                          </p:val>
+                                        </p:tav>
+                                      </p:tavLst>
+                                    </p:anim>
+                                    <p:anim calcmode="lin" valueType="num">
+                                      <p:cBhvr>
+                                        <p:cTn id="8" dur="1000" fill="hold"/>
+                                        <p:tgtEl>
+                                          <p:spTgt spid="2"/>
+                                        </p:tgtEl>
+                                        <p:attrNameLst>
+                                          <p:attrName>ppt_h</p:attrName>
+                                        </p:attrNameLst>
+                                      </p:cBhvr>
+                                      <p:tavLst>
+                                        <p:tav tm="0">
+                                          <p:val>
+                                            <p:fltVal val="0"/>
+                                          </p:val>
+                                        </p:tav>
+                                        <p:tav tm="100000">
+                                          <p:val>
+                                            <p:strVal val="#ppt_h"/>
+                                          </p:val>
+                                        </p:tav>
+                                      </p:tavLst>
+                                    </p:anim>
+                                    <p:anim calcmode="lin" valueType="num">
+                                      <p:cBhvr>
+                                        <p:cTn id="9" dur="1000" fill="hold"/>
+                                        <p:tgtEl>
+                                          <p:spTgt spid="2"/>
+                                        </p:tgtEl>
+                                        <p:attrNameLst>
+                                          <p:attrName>style.rotation</p:attrName>
+                                        </p:attrNameLst>
+                                      </p:cBhvr>
+                                      <p:tavLst>
+                                        <p:tav tm="0">
+                                          <p:val>
+                                            <p:fltVal val="90"/>
+                                          </p:val>
+                                        </p:tav>
+                                        <p:tav tm="100000">
+                                          <p:val>
+                                            <p:fltVal val="0"/>
+                                          </p:val>
+                                        </p:tav>
+                                      </p:tavLst>
+                                    </p:anim>
+                                    <p:animEffect transition="in" filter="fade">
+                                      <p:cBhvr>
+                                        <p:cTn id="10" dur="1000"/>
+                                        <p:tgtEl>
+                                          <p:spTgt spid="2"/>
+                                        </p:tgtEl>
+                                      </p:cBhvr>
+                                    </p:animEffect>
+                                  </p:childTnLst>
+                                </p:cTn>
+                              </p:par>
+                            </p:childTnLst>
+                          </p:cTn>
+                        </p:par>
+                      </p:childTnLst>
+                    </p:cTn>
+                  </p:par>
+                </p:childTnLst>
+              </p:cTn>
+              <p:prevCondLst>
+                <p:cond evt="onPrev" delay="0">
+                  <p:tgtEl>
+                    <p:sldTgt/>
+                  </p:tgtEl>
+                </p:cond>
+              </p:prevCondLst>
+              <p:nextCondLst>
+                <p:cond evt="onNext" delay="0">
+                  <p:tgtEl>
+                    <p:sldTgt/>
+                  </p:tgtEl>
+                </p:cond>
+              </p:nextCondLst>
+            </p:seq>
+          </p:childTnLst>
+        </p:cTn>
       </p:par>
     </p:tnLst>
   </p:timing>
@@ -4261,27 +4616,3262 @@
                 </a:solidFill>
                 <a:latin typeface="Eras Bold ITC" pitchFamily="34" charset="0"/>
               </a:rPr>
-              <a:t>Conclusie</a:t>
-            </a:r>
-            <a:endParaRPr lang="nl-NL" dirty="0">
-              <a:solidFill>
-                <a:schemeClr val="bg1"/>
-              </a:solidFill>
-              <a:latin typeface="Eras Bold ITC" pitchFamily="34" charset="0"/>
-            </a:endParaRPr>
+              <a:t>Het proces</a:t>
+            </a:r>
           </a:p>
         </p:txBody>
       </p:sp>
       <p:pic>
         <p:nvPicPr>
-          <p:cNvPr id="5122" name="Picture 2" descr="http://smallbiztrends.com/wp-content/uploads/2010/10/true-false2.jpg"/>
+          <p:cNvPr id="7" name="Afbeelding 6"/>
+          <p:cNvPicPr>
+            <a:picLocks noChangeAspect="1"/>
+          </p:cNvPicPr>
+          <p:nvPr/>
+        </p:nvPicPr>
+        <p:blipFill>
+          <a:blip r:embed="rId3">
+            <a:extLst>
+              <a:ext uri="{28A0092B-C50C-407E-A947-70E740481C1C}">
+                <a14:useLocalDpi xmlns:a14="http://schemas.microsoft.com/office/drawing/2010/main" val="0"/>
+              </a:ext>
+            </a:extLst>
+          </a:blip>
+          <a:stretch>
+            <a:fillRect/>
+          </a:stretch>
+        </p:blipFill>
+        <p:spPr>
+          <a:xfrm>
+            <a:off x="3777920" y="1300555"/>
+            <a:ext cx="1876191" cy="1552381"/>
+          </a:xfrm>
+          <a:prstGeom prst="rect">
+            <a:avLst/>
+          </a:prstGeom>
+        </p:spPr>
+      </p:pic>
+      <p:pic>
+        <p:nvPicPr>
+          <p:cNvPr id="8" name="Afbeelding 7"/>
+          <p:cNvPicPr>
+            <a:picLocks noChangeAspect="1"/>
+          </p:cNvPicPr>
+          <p:nvPr/>
+        </p:nvPicPr>
+        <p:blipFill>
+          <a:blip r:embed="rId4">
+            <a:extLst>
+              <a:ext uri="{28A0092B-C50C-407E-A947-70E740481C1C}">
+                <a14:useLocalDpi xmlns:a14="http://schemas.microsoft.com/office/drawing/2010/main" val="0"/>
+              </a:ext>
+            </a:extLst>
+          </a:blip>
+          <a:stretch>
+            <a:fillRect/>
+          </a:stretch>
+        </p:blipFill>
+        <p:spPr>
+          <a:xfrm>
+            <a:off x="2051720" y="1557458"/>
+            <a:ext cx="1440000" cy="1440000"/>
+          </a:xfrm>
+          <a:prstGeom prst="rect">
+            <a:avLst/>
+          </a:prstGeom>
+        </p:spPr>
+      </p:pic>
+      <p:pic>
+        <p:nvPicPr>
+          <p:cNvPr id="10" name="Afbeelding 9"/>
+          <p:cNvPicPr>
+            <a:picLocks noChangeAspect="1"/>
+          </p:cNvPicPr>
+          <p:nvPr/>
+        </p:nvPicPr>
+        <p:blipFill>
+          <a:blip r:embed="rId5">
+            <a:extLst>
+              <a:ext uri="{28A0092B-C50C-407E-A947-70E740481C1C}">
+                <a14:useLocalDpi xmlns:a14="http://schemas.microsoft.com/office/drawing/2010/main" val="0"/>
+              </a:ext>
+            </a:extLst>
+          </a:blip>
+          <a:stretch>
+            <a:fillRect/>
+          </a:stretch>
+        </p:blipFill>
+        <p:spPr>
+          <a:xfrm>
+            <a:off x="155950" y="5229200"/>
+            <a:ext cx="3467584" cy="1057423"/>
+          </a:xfrm>
+          <a:prstGeom prst="rect">
+            <a:avLst/>
+          </a:prstGeom>
+        </p:spPr>
+      </p:pic>
+      <p:pic>
+        <p:nvPicPr>
+          <p:cNvPr id="11" name="Afbeelding 10"/>
+          <p:cNvPicPr>
+            <a:picLocks noChangeAspect="1"/>
+          </p:cNvPicPr>
+          <p:nvPr/>
+        </p:nvPicPr>
+        <p:blipFill>
+          <a:blip r:embed="rId6">
+            <a:extLst>
+              <a:ext uri="{28A0092B-C50C-407E-A947-70E740481C1C}">
+                <a14:useLocalDpi xmlns:a14="http://schemas.microsoft.com/office/drawing/2010/main" val="0"/>
+              </a:ext>
+            </a:extLst>
+          </a:blip>
+          <a:stretch>
+            <a:fillRect/>
+          </a:stretch>
+        </p:blipFill>
+        <p:spPr>
+          <a:xfrm>
+            <a:off x="6308153" y="3140968"/>
+            <a:ext cx="2372056" cy="1457529"/>
+          </a:xfrm>
+          <a:prstGeom prst="rect">
+            <a:avLst/>
+          </a:prstGeom>
+        </p:spPr>
+      </p:pic>
+      <p:pic>
+        <p:nvPicPr>
+          <p:cNvPr id="12" name="Afbeelding 11"/>
+          <p:cNvPicPr>
+            <a:picLocks noChangeAspect="1"/>
+          </p:cNvPicPr>
+          <p:nvPr/>
+        </p:nvPicPr>
+        <p:blipFill>
+          <a:blip r:embed="rId7">
+            <a:extLst>
+              <a:ext uri="{28A0092B-C50C-407E-A947-70E740481C1C}">
+                <a14:useLocalDpi xmlns:a14="http://schemas.microsoft.com/office/drawing/2010/main" val="0"/>
+              </a:ext>
+            </a:extLst>
+          </a:blip>
+          <a:stretch>
+            <a:fillRect/>
+          </a:stretch>
+        </p:blipFill>
+        <p:spPr>
+          <a:xfrm>
+            <a:off x="6156176" y="1503612"/>
+            <a:ext cx="2697857" cy="1402276"/>
+          </a:xfrm>
+          <a:prstGeom prst="rect">
+            <a:avLst/>
+          </a:prstGeom>
+        </p:spPr>
+      </p:pic>
+      <p:pic>
+        <p:nvPicPr>
+          <p:cNvPr id="13" name="Afbeelding 12"/>
+          <p:cNvPicPr>
+            <a:picLocks noChangeAspect="1"/>
+          </p:cNvPicPr>
+          <p:nvPr/>
+        </p:nvPicPr>
+        <p:blipFill>
+          <a:blip r:embed="rId8">
+            <a:extLst>
+              <a:ext uri="{28A0092B-C50C-407E-A947-70E740481C1C}">
+                <a14:useLocalDpi xmlns:a14="http://schemas.microsoft.com/office/drawing/2010/main" val="0"/>
+              </a:ext>
+            </a:extLst>
+          </a:blip>
+          <a:stretch>
+            <a:fillRect/>
+          </a:stretch>
+        </p:blipFill>
+        <p:spPr>
+          <a:xfrm>
+            <a:off x="166459" y="3429160"/>
+            <a:ext cx="1440000" cy="1440000"/>
+          </a:xfrm>
+          <a:prstGeom prst="rect">
+            <a:avLst/>
+          </a:prstGeom>
+        </p:spPr>
+      </p:pic>
+      <p:pic>
+        <p:nvPicPr>
+          <p:cNvPr id="14" name="Afbeelding 13"/>
+          <p:cNvPicPr>
+            <a:picLocks noChangeAspect="1"/>
+          </p:cNvPicPr>
+          <p:nvPr/>
+        </p:nvPicPr>
+        <p:blipFill>
+          <a:blip r:embed="rId9">
+            <a:extLst>
+              <a:ext uri="{28A0092B-C50C-407E-A947-70E740481C1C}">
+                <a14:useLocalDpi xmlns:a14="http://schemas.microsoft.com/office/drawing/2010/main" val="0"/>
+              </a:ext>
+            </a:extLst>
+          </a:blip>
+          <a:stretch>
+            <a:fillRect/>
+          </a:stretch>
+        </p:blipFill>
+        <p:spPr>
+          <a:xfrm>
+            <a:off x="2051720" y="3429160"/>
+            <a:ext cx="1408282" cy="1440000"/>
+          </a:xfrm>
+          <a:prstGeom prst="rect">
+            <a:avLst/>
+          </a:prstGeom>
+        </p:spPr>
+      </p:pic>
+      <p:pic>
+        <p:nvPicPr>
+          <p:cNvPr id="15" name="Afbeelding 14"/>
+          <p:cNvPicPr>
+            <a:picLocks noChangeAspect="1"/>
+          </p:cNvPicPr>
+          <p:nvPr/>
+        </p:nvPicPr>
+        <p:blipFill>
+          <a:blip r:embed="rId10">
+            <a:extLst>
+              <a:ext uri="{28A0092B-C50C-407E-A947-70E740481C1C}">
+                <a14:useLocalDpi xmlns:a14="http://schemas.microsoft.com/office/drawing/2010/main" val="0"/>
+              </a:ext>
+            </a:extLst>
+          </a:blip>
+          <a:stretch>
+            <a:fillRect/>
+          </a:stretch>
+        </p:blipFill>
+        <p:spPr>
+          <a:xfrm>
+            <a:off x="167947" y="1557458"/>
+            <a:ext cx="1447310" cy="1440000"/>
+          </a:xfrm>
+          <a:prstGeom prst="rect">
+            <a:avLst/>
+          </a:prstGeom>
+        </p:spPr>
+      </p:pic>
+      <p:pic>
+        <p:nvPicPr>
+          <p:cNvPr id="9" name="Afbeelding 8"/>
+          <p:cNvPicPr>
+            <a:picLocks noChangeAspect="1"/>
+          </p:cNvPicPr>
+          <p:nvPr/>
+        </p:nvPicPr>
+        <p:blipFill>
+          <a:blip r:embed="rId11">
+            <a:extLst>
+              <a:ext uri="{28A0092B-C50C-407E-A947-70E740481C1C}">
+                <a14:useLocalDpi xmlns:a14="http://schemas.microsoft.com/office/drawing/2010/main" val="0"/>
+              </a:ext>
+            </a:extLst>
+          </a:blip>
+          <a:stretch>
+            <a:fillRect/>
+          </a:stretch>
+        </p:blipFill>
+        <p:spPr>
+          <a:xfrm>
+            <a:off x="3694316" y="3669677"/>
+            <a:ext cx="2043398" cy="2693570"/>
+          </a:xfrm>
+          <a:prstGeom prst="rect">
+            <a:avLst/>
+          </a:prstGeom>
+        </p:spPr>
+      </p:pic>
+      <p:sp>
+        <p:nvSpPr>
+          <p:cNvPr id="16" name="Tekstvak 15"/>
+          <p:cNvSpPr txBox="1"/>
+          <p:nvPr/>
+        </p:nvSpPr>
+        <p:spPr>
+          <a:xfrm>
+            <a:off x="6411310" y="5172542"/>
+            <a:ext cx="2187587" cy="1200329"/>
+          </a:xfrm>
+          <a:prstGeom prst="rect">
+            <a:avLst/>
+          </a:prstGeom>
+          <a:noFill/>
+        </p:spPr>
+        <p:txBody>
+          <a:bodyPr wrap="none" rtlCol="0">
+            <a:spAutoFit/>
+          </a:bodyPr>
+          <a:lstStyle/>
+          <a:p>
+            <a:r>
+              <a:rPr lang="nl-NL" sz="7200" b="1" dirty="0" smtClean="0"/>
+              <a:t>LDAP</a:t>
+            </a:r>
+            <a:endParaRPr lang="nl-NL" sz="7200" b="1" dirty="0"/>
+          </a:p>
+        </p:txBody>
+      </p:sp>
+    </p:spTree>
+    <p:extLst>
+      <p:ext uri="{BB962C8B-B14F-4D97-AF65-F5344CB8AC3E}">
+        <p14:creationId xmlns:p14="http://schemas.microsoft.com/office/powerpoint/2010/main" val="2167774646"/>
+      </p:ext>
+    </p:extLst>
+  </p:cSld>
+  <p:clrMapOvr>
+    <a:masterClrMapping/>
+  </p:clrMapOvr>
+  <mc:AlternateContent xmlns:mc="http://schemas.openxmlformats.org/markup-compatibility/2006" xmlns:p14="http://schemas.microsoft.com/office/powerpoint/2010/main">
+    <mc:Choice Requires="p14">
+      <p:transition spd="slow" p14:dur="800">
+        <p14:flythrough/>
+      </p:transition>
+    </mc:Choice>
+    <mc:Fallback xmlns="">
+      <p:transition spd="slow">
+        <p:fade/>
+      </p:transition>
+    </mc:Fallback>
+  </mc:AlternateContent>
+  <p:timing>
+    <p:tnLst>
+      <p:par>
+        <p:cTn id="1" dur="indefinite" restart="never" nodeType="tmRoot">
+          <p:childTnLst>
+            <p:seq concurrent="1" nextAc="seek">
+              <p:cTn id="2" dur="indefinite" nodeType="mainSeq">
+                <p:childTnLst>
+                  <p:par>
+                    <p:cTn id="3" fill="hold">
+                      <p:stCondLst>
+                        <p:cond delay="indefinite"/>
+                        <p:cond evt="onBegin" delay="0">
+                          <p:tn val="2"/>
+                        </p:cond>
+                      </p:stCondLst>
+                      <p:childTnLst>
+                        <p:par>
+                          <p:cTn id="4" fill="hold">
+                            <p:stCondLst>
+                              <p:cond delay="0"/>
+                            </p:stCondLst>
+                            <p:childTnLst>
+                              <p:par>
+                                <p:cTn id="5" presetID="26" presetClass="entr" presetSubtype="0" fill="hold" nodeType="withEffect">
+                                  <p:stCondLst>
+                                    <p:cond delay="0"/>
+                                  </p:stCondLst>
+                                  <p:childTnLst>
+                                    <p:set>
+                                      <p:cBhvr>
+                                        <p:cTn id="6" dur="1" fill="hold">
+                                          <p:stCondLst>
+                                            <p:cond delay="0"/>
+                                          </p:stCondLst>
+                                        </p:cTn>
+                                        <p:tgtEl>
+                                          <p:spTgt spid="15"/>
+                                        </p:tgtEl>
+                                        <p:attrNameLst>
+                                          <p:attrName>style.visibility</p:attrName>
+                                        </p:attrNameLst>
+                                      </p:cBhvr>
+                                      <p:to>
+                                        <p:strVal val="visible"/>
+                                      </p:to>
+                                    </p:set>
+                                    <p:animEffect transition="in" filter="wipe(down)">
+                                      <p:cBhvr>
+                                        <p:cTn id="7" dur="580">
+                                          <p:stCondLst>
+                                            <p:cond delay="0"/>
+                                          </p:stCondLst>
+                                        </p:cTn>
+                                        <p:tgtEl>
+                                          <p:spTgt spid="15"/>
+                                        </p:tgtEl>
+                                      </p:cBhvr>
+                                    </p:animEffect>
+                                    <p:anim calcmode="lin" valueType="num">
+                                      <p:cBhvr>
+                                        <p:cTn id="8" dur="1822" tmFilter="0,0; 0.14,0.36; 0.43,0.73; 0.71,0.91; 1.0,1.0">
+                                          <p:stCondLst>
+                                            <p:cond delay="0"/>
+                                          </p:stCondLst>
+                                        </p:cTn>
+                                        <p:tgtEl>
+                                          <p:spTgt spid="15"/>
+                                        </p:tgtEl>
+                                        <p:attrNameLst>
+                                          <p:attrName>ppt_x</p:attrName>
+                                        </p:attrNameLst>
+                                      </p:cBhvr>
+                                      <p:tavLst>
+                                        <p:tav tm="0">
+                                          <p:val>
+                                            <p:strVal val="#ppt_x-0.25"/>
+                                          </p:val>
+                                        </p:tav>
+                                        <p:tav tm="100000">
+                                          <p:val>
+                                            <p:strVal val="#ppt_x"/>
+                                          </p:val>
+                                        </p:tav>
+                                      </p:tavLst>
+                                    </p:anim>
+                                    <p:anim calcmode="lin" valueType="num">
+                                      <p:cBhvr>
+                                        <p:cTn id="9" dur="664" tmFilter="0.0,0.0; 0.25,0.07; 0.50,0.2; 0.75,0.467; 1.0,1.0">
+                                          <p:stCondLst>
+                                            <p:cond delay="0"/>
+                                          </p:stCondLst>
+                                        </p:cTn>
+                                        <p:tgtEl>
+                                          <p:spTgt spid="15"/>
+                                        </p:tgtEl>
+                                        <p:attrNameLst>
+                                          <p:attrName>ppt_y</p:attrName>
+                                        </p:attrNameLst>
+                                      </p:cBhvr>
+                                      <p:tavLst>
+                                        <p:tav tm="0" fmla="#ppt_y-sin(pi*$)/3">
+                                          <p:val>
+                                            <p:fltVal val="0.5"/>
+                                          </p:val>
+                                        </p:tav>
+                                        <p:tav tm="100000">
+                                          <p:val>
+                                            <p:fltVal val="1"/>
+                                          </p:val>
+                                        </p:tav>
+                                      </p:tavLst>
+                                    </p:anim>
+                                    <p:anim calcmode="lin" valueType="num">
+                                      <p:cBhvr>
+                                        <p:cTn id="10" dur="664" tmFilter="0, 0; 0.125,0.2665; 0.25,0.4; 0.375,0.465; 0.5,0.5;  0.625,0.535; 0.75,0.6; 0.875,0.7335; 1,1">
+                                          <p:stCondLst>
+                                            <p:cond delay="664"/>
+                                          </p:stCondLst>
+                                        </p:cTn>
+                                        <p:tgtEl>
+                                          <p:spTgt spid="15"/>
+                                        </p:tgtEl>
+                                        <p:attrNameLst>
+                                          <p:attrName>ppt_y</p:attrName>
+                                        </p:attrNameLst>
+                                      </p:cBhvr>
+                                      <p:tavLst>
+                                        <p:tav tm="0" fmla="#ppt_y-sin(pi*$)/9">
+                                          <p:val>
+                                            <p:fltVal val="0"/>
+                                          </p:val>
+                                        </p:tav>
+                                        <p:tav tm="100000">
+                                          <p:val>
+                                            <p:fltVal val="1"/>
+                                          </p:val>
+                                        </p:tav>
+                                      </p:tavLst>
+                                    </p:anim>
+                                    <p:anim calcmode="lin" valueType="num">
+                                      <p:cBhvr>
+                                        <p:cTn id="11" dur="332" tmFilter="0, 0; 0.125,0.2665; 0.25,0.4; 0.375,0.465; 0.5,0.5;  0.625,0.535; 0.75,0.6; 0.875,0.7335; 1,1">
+                                          <p:stCondLst>
+                                            <p:cond delay="1324"/>
+                                          </p:stCondLst>
+                                        </p:cTn>
+                                        <p:tgtEl>
+                                          <p:spTgt spid="15"/>
+                                        </p:tgtEl>
+                                        <p:attrNameLst>
+                                          <p:attrName>ppt_y</p:attrName>
+                                        </p:attrNameLst>
+                                      </p:cBhvr>
+                                      <p:tavLst>
+                                        <p:tav tm="0" fmla="#ppt_y-sin(pi*$)/27">
+                                          <p:val>
+                                            <p:fltVal val="0"/>
+                                          </p:val>
+                                        </p:tav>
+                                        <p:tav tm="100000">
+                                          <p:val>
+                                            <p:fltVal val="1"/>
+                                          </p:val>
+                                        </p:tav>
+                                      </p:tavLst>
+                                    </p:anim>
+                                    <p:anim calcmode="lin" valueType="num">
+                                      <p:cBhvr>
+                                        <p:cTn id="12" dur="164" tmFilter="0, 0; 0.125,0.2665; 0.25,0.4; 0.375,0.465; 0.5,0.5;  0.625,0.535; 0.75,0.6; 0.875,0.7335; 1,1">
+                                          <p:stCondLst>
+                                            <p:cond delay="1656"/>
+                                          </p:stCondLst>
+                                        </p:cTn>
+                                        <p:tgtEl>
+                                          <p:spTgt spid="15"/>
+                                        </p:tgtEl>
+                                        <p:attrNameLst>
+                                          <p:attrName>ppt_y</p:attrName>
+                                        </p:attrNameLst>
+                                      </p:cBhvr>
+                                      <p:tavLst>
+                                        <p:tav tm="0" fmla="#ppt_y-sin(pi*$)/81">
+                                          <p:val>
+                                            <p:fltVal val="0"/>
+                                          </p:val>
+                                        </p:tav>
+                                        <p:tav tm="100000">
+                                          <p:val>
+                                            <p:fltVal val="1"/>
+                                          </p:val>
+                                        </p:tav>
+                                      </p:tavLst>
+                                    </p:anim>
+                                    <p:animScale>
+                                      <p:cBhvr>
+                                        <p:cTn id="13" dur="26">
+                                          <p:stCondLst>
+                                            <p:cond delay="650"/>
+                                          </p:stCondLst>
+                                        </p:cTn>
+                                        <p:tgtEl>
+                                          <p:spTgt spid="15"/>
+                                        </p:tgtEl>
+                                      </p:cBhvr>
+                                      <p:to x="100000" y="60000"/>
+                                    </p:animScale>
+                                    <p:animScale>
+                                      <p:cBhvr>
+                                        <p:cTn id="14" dur="166" decel="50000">
+                                          <p:stCondLst>
+                                            <p:cond delay="676"/>
+                                          </p:stCondLst>
+                                        </p:cTn>
+                                        <p:tgtEl>
+                                          <p:spTgt spid="15"/>
+                                        </p:tgtEl>
+                                      </p:cBhvr>
+                                      <p:to x="100000" y="100000"/>
+                                    </p:animScale>
+                                    <p:animScale>
+                                      <p:cBhvr>
+                                        <p:cTn id="15" dur="26">
+                                          <p:stCondLst>
+                                            <p:cond delay="1312"/>
+                                          </p:stCondLst>
+                                        </p:cTn>
+                                        <p:tgtEl>
+                                          <p:spTgt spid="15"/>
+                                        </p:tgtEl>
+                                      </p:cBhvr>
+                                      <p:to x="100000" y="80000"/>
+                                    </p:animScale>
+                                    <p:animScale>
+                                      <p:cBhvr>
+                                        <p:cTn id="16" dur="166" decel="50000">
+                                          <p:stCondLst>
+                                            <p:cond delay="1338"/>
+                                          </p:stCondLst>
+                                        </p:cTn>
+                                        <p:tgtEl>
+                                          <p:spTgt spid="15"/>
+                                        </p:tgtEl>
+                                      </p:cBhvr>
+                                      <p:to x="100000" y="100000"/>
+                                    </p:animScale>
+                                    <p:animScale>
+                                      <p:cBhvr>
+                                        <p:cTn id="17" dur="26">
+                                          <p:stCondLst>
+                                            <p:cond delay="1642"/>
+                                          </p:stCondLst>
+                                        </p:cTn>
+                                        <p:tgtEl>
+                                          <p:spTgt spid="15"/>
+                                        </p:tgtEl>
+                                      </p:cBhvr>
+                                      <p:to x="100000" y="90000"/>
+                                    </p:animScale>
+                                    <p:animScale>
+                                      <p:cBhvr>
+                                        <p:cTn id="18" dur="166" decel="50000">
+                                          <p:stCondLst>
+                                            <p:cond delay="1668"/>
+                                          </p:stCondLst>
+                                        </p:cTn>
+                                        <p:tgtEl>
+                                          <p:spTgt spid="15"/>
+                                        </p:tgtEl>
+                                      </p:cBhvr>
+                                      <p:to x="100000" y="100000"/>
+                                    </p:animScale>
+                                    <p:animScale>
+                                      <p:cBhvr>
+                                        <p:cTn id="19" dur="26">
+                                          <p:stCondLst>
+                                            <p:cond delay="1808"/>
+                                          </p:stCondLst>
+                                        </p:cTn>
+                                        <p:tgtEl>
+                                          <p:spTgt spid="15"/>
+                                        </p:tgtEl>
+                                      </p:cBhvr>
+                                      <p:to x="100000" y="95000"/>
+                                    </p:animScale>
+                                    <p:animScale>
+                                      <p:cBhvr>
+                                        <p:cTn id="20" dur="166" decel="50000">
+                                          <p:stCondLst>
+                                            <p:cond delay="1834"/>
+                                          </p:stCondLst>
+                                        </p:cTn>
+                                        <p:tgtEl>
+                                          <p:spTgt spid="15"/>
+                                        </p:tgtEl>
+                                      </p:cBhvr>
+                                      <p:to x="100000" y="100000"/>
+                                    </p:animScale>
+                                  </p:childTnLst>
+                                </p:cTn>
+                              </p:par>
+                              <p:par>
+                                <p:cTn id="21" presetID="26" presetClass="entr" presetSubtype="0" fill="hold" nodeType="withEffect">
+                                  <p:stCondLst>
+                                    <p:cond delay="0"/>
+                                  </p:stCondLst>
+                                  <p:childTnLst>
+                                    <p:set>
+                                      <p:cBhvr>
+                                        <p:cTn id="22" dur="1" fill="hold">
+                                          <p:stCondLst>
+                                            <p:cond delay="0"/>
+                                          </p:stCondLst>
+                                        </p:cTn>
+                                        <p:tgtEl>
+                                          <p:spTgt spid="8"/>
+                                        </p:tgtEl>
+                                        <p:attrNameLst>
+                                          <p:attrName>style.visibility</p:attrName>
+                                        </p:attrNameLst>
+                                      </p:cBhvr>
+                                      <p:to>
+                                        <p:strVal val="visible"/>
+                                      </p:to>
+                                    </p:set>
+                                    <p:animEffect transition="in" filter="wipe(down)">
+                                      <p:cBhvr>
+                                        <p:cTn id="23" dur="580">
+                                          <p:stCondLst>
+                                            <p:cond delay="0"/>
+                                          </p:stCondLst>
+                                        </p:cTn>
+                                        <p:tgtEl>
+                                          <p:spTgt spid="8"/>
+                                        </p:tgtEl>
+                                      </p:cBhvr>
+                                    </p:animEffect>
+                                    <p:anim calcmode="lin" valueType="num">
+                                      <p:cBhvr>
+                                        <p:cTn id="24" dur="1822" tmFilter="0,0; 0.14,0.36; 0.43,0.73; 0.71,0.91; 1.0,1.0">
+                                          <p:stCondLst>
+                                            <p:cond delay="0"/>
+                                          </p:stCondLst>
+                                        </p:cTn>
+                                        <p:tgtEl>
+                                          <p:spTgt spid="8"/>
+                                        </p:tgtEl>
+                                        <p:attrNameLst>
+                                          <p:attrName>ppt_x</p:attrName>
+                                        </p:attrNameLst>
+                                      </p:cBhvr>
+                                      <p:tavLst>
+                                        <p:tav tm="0">
+                                          <p:val>
+                                            <p:strVal val="#ppt_x-0.25"/>
+                                          </p:val>
+                                        </p:tav>
+                                        <p:tav tm="100000">
+                                          <p:val>
+                                            <p:strVal val="#ppt_x"/>
+                                          </p:val>
+                                        </p:tav>
+                                      </p:tavLst>
+                                    </p:anim>
+                                    <p:anim calcmode="lin" valueType="num">
+                                      <p:cBhvr>
+                                        <p:cTn id="25" dur="664" tmFilter="0.0,0.0; 0.25,0.07; 0.50,0.2; 0.75,0.467; 1.0,1.0">
+                                          <p:stCondLst>
+                                            <p:cond delay="0"/>
+                                          </p:stCondLst>
+                                        </p:cTn>
+                                        <p:tgtEl>
+                                          <p:spTgt spid="8"/>
+                                        </p:tgtEl>
+                                        <p:attrNameLst>
+                                          <p:attrName>ppt_y</p:attrName>
+                                        </p:attrNameLst>
+                                      </p:cBhvr>
+                                      <p:tavLst>
+                                        <p:tav tm="0" fmla="#ppt_y-sin(pi*$)/3">
+                                          <p:val>
+                                            <p:fltVal val="0.5"/>
+                                          </p:val>
+                                        </p:tav>
+                                        <p:tav tm="100000">
+                                          <p:val>
+                                            <p:fltVal val="1"/>
+                                          </p:val>
+                                        </p:tav>
+                                      </p:tavLst>
+                                    </p:anim>
+                                    <p:anim calcmode="lin" valueType="num">
+                                      <p:cBhvr>
+                                        <p:cTn id="26" dur="664" tmFilter="0, 0; 0.125,0.2665; 0.25,0.4; 0.375,0.465; 0.5,0.5;  0.625,0.535; 0.75,0.6; 0.875,0.7335; 1,1">
+                                          <p:stCondLst>
+                                            <p:cond delay="664"/>
+                                          </p:stCondLst>
+                                        </p:cTn>
+                                        <p:tgtEl>
+                                          <p:spTgt spid="8"/>
+                                        </p:tgtEl>
+                                        <p:attrNameLst>
+                                          <p:attrName>ppt_y</p:attrName>
+                                        </p:attrNameLst>
+                                      </p:cBhvr>
+                                      <p:tavLst>
+                                        <p:tav tm="0" fmla="#ppt_y-sin(pi*$)/9">
+                                          <p:val>
+                                            <p:fltVal val="0"/>
+                                          </p:val>
+                                        </p:tav>
+                                        <p:tav tm="100000">
+                                          <p:val>
+                                            <p:fltVal val="1"/>
+                                          </p:val>
+                                        </p:tav>
+                                      </p:tavLst>
+                                    </p:anim>
+                                    <p:anim calcmode="lin" valueType="num">
+                                      <p:cBhvr>
+                                        <p:cTn id="27" dur="332" tmFilter="0, 0; 0.125,0.2665; 0.25,0.4; 0.375,0.465; 0.5,0.5;  0.625,0.535; 0.75,0.6; 0.875,0.7335; 1,1">
+                                          <p:stCondLst>
+                                            <p:cond delay="1324"/>
+                                          </p:stCondLst>
+                                        </p:cTn>
+                                        <p:tgtEl>
+                                          <p:spTgt spid="8"/>
+                                        </p:tgtEl>
+                                        <p:attrNameLst>
+                                          <p:attrName>ppt_y</p:attrName>
+                                        </p:attrNameLst>
+                                      </p:cBhvr>
+                                      <p:tavLst>
+                                        <p:tav tm="0" fmla="#ppt_y-sin(pi*$)/27">
+                                          <p:val>
+                                            <p:fltVal val="0"/>
+                                          </p:val>
+                                        </p:tav>
+                                        <p:tav tm="100000">
+                                          <p:val>
+                                            <p:fltVal val="1"/>
+                                          </p:val>
+                                        </p:tav>
+                                      </p:tavLst>
+                                    </p:anim>
+                                    <p:anim calcmode="lin" valueType="num">
+                                      <p:cBhvr>
+                                        <p:cTn id="28" dur="164" tmFilter="0, 0; 0.125,0.2665; 0.25,0.4; 0.375,0.465; 0.5,0.5;  0.625,0.535; 0.75,0.6; 0.875,0.7335; 1,1">
+                                          <p:stCondLst>
+                                            <p:cond delay="1656"/>
+                                          </p:stCondLst>
+                                        </p:cTn>
+                                        <p:tgtEl>
+                                          <p:spTgt spid="8"/>
+                                        </p:tgtEl>
+                                        <p:attrNameLst>
+                                          <p:attrName>ppt_y</p:attrName>
+                                        </p:attrNameLst>
+                                      </p:cBhvr>
+                                      <p:tavLst>
+                                        <p:tav tm="0" fmla="#ppt_y-sin(pi*$)/81">
+                                          <p:val>
+                                            <p:fltVal val="0"/>
+                                          </p:val>
+                                        </p:tav>
+                                        <p:tav tm="100000">
+                                          <p:val>
+                                            <p:fltVal val="1"/>
+                                          </p:val>
+                                        </p:tav>
+                                      </p:tavLst>
+                                    </p:anim>
+                                    <p:animScale>
+                                      <p:cBhvr>
+                                        <p:cTn id="29" dur="26">
+                                          <p:stCondLst>
+                                            <p:cond delay="650"/>
+                                          </p:stCondLst>
+                                        </p:cTn>
+                                        <p:tgtEl>
+                                          <p:spTgt spid="8"/>
+                                        </p:tgtEl>
+                                      </p:cBhvr>
+                                      <p:to x="100000" y="60000"/>
+                                    </p:animScale>
+                                    <p:animScale>
+                                      <p:cBhvr>
+                                        <p:cTn id="30" dur="166" decel="50000">
+                                          <p:stCondLst>
+                                            <p:cond delay="676"/>
+                                          </p:stCondLst>
+                                        </p:cTn>
+                                        <p:tgtEl>
+                                          <p:spTgt spid="8"/>
+                                        </p:tgtEl>
+                                      </p:cBhvr>
+                                      <p:to x="100000" y="100000"/>
+                                    </p:animScale>
+                                    <p:animScale>
+                                      <p:cBhvr>
+                                        <p:cTn id="31" dur="26">
+                                          <p:stCondLst>
+                                            <p:cond delay="1312"/>
+                                          </p:stCondLst>
+                                        </p:cTn>
+                                        <p:tgtEl>
+                                          <p:spTgt spid="8"/>
+                                        </p:tgtEl>
+                                      </p:cBhvr>
+                                      <p:to x="100000" y="80000"/>
+                                    </p:animScale>
+                                    <p:animScale>
+                                      <p:cBhvr>
+                                        <p:cTn id="32" dur="166" decel="50000">
+                                          <p:stCondLst>
+                                            <p:cond delay="1338"/>
+                                          </p:stCondLst>
+                                        </p:cTn>
+                                        <p:tgtEl>
+                                          <p:spTgt spid="8"/>
+                                        </p:tgtEl>
+                                      </p:cBhvr>
+                                      <p:to x="100000" y="100000"/>
+                                    </p:animScale>
+                                    <p:animScale>
+                                      <p:cBhvr>
+                                        <p:cTn id="33" dur="26">
+                                          <p:stCondLst>
+                                            <p:cond delay="1642"/>
+                                          </p:stCondLst>
+                                        </p:cTn>
+                                        <p:tgtEl>
+                                          <p:spTgt spid="8"/>
+                                        </p:tgtEl>
+                                      </p:cBhvr>
+                                      <p:to x="100000" y="90000"/>
+                                    </p:animScale>
+                                    <p:animScale>
+                                      <p:cBhvr>
+                                        <p:cTn id="34" dur="166" decel="50000">
+                                          <p:stCondLst>
+                                            <p:cond delay="1668"/>
+                                          </p:stCondLst>
+                                        </p:cTn>
+                                        <p:tgtEl>
+                                          <p:spTgt spid="8"/>
+                                        </p:tgtEl>
+                                      </p:cBhvr>
+                                      <p:to x="100000" y="100000"/>
+                                    </p:animScale>
+                                    <p:animScale>
+                                      <p:cBhvr>
+                                        <p:cTn id="35" dur="26">
+                                          <p:stCondLst>
+                                            <p:cond delay="1808"/>
+                                          </p:stCondLst>
+                                        </p:cTn>
+                                        <p:tgtEl>
+                                          <p:spTgt spid="8"/>
+                                        </p:tgtEl>
+                                      </p:cBhvr>
+                                      <p:to x="100000" y="95000"/>
+                                    </p:animScale>
+                                    <p:animScale>
+                                      <p:cBhvr>
+                                        <p:cTn id="36" dur="166" decel="50000">
+                                          <p:stCondLst>
+                                            <p:cond delay="1834"/>
+                                          </p:stCondLst>
+                                        </p:cTn>
+                                        <p:tgtEl>
+                                          <p:spTgt spid="8"/>
+                                        </p:tgtEl>
+                                      </p:cBhvr>
+                                      <p:to x="100000" y="100000"/>
+                                    </p:animScale>
+                                  </p:childTnLst>
+                                </p:cTn>
+                              </p:par>
+                              <p:par>
+                                <p:cTn id="37" presetID="26" presetClass="entr" presetSubtype="0" fill="hold" nodeType="withEffect">
+                                  <p:stCondLst>
+                                    <p:cond delay="0"/>
+                                  </p:stCondLst>
+                                  <p:childTnLst>
+                                    <p:set>
+                                      <p:cBhvr>
+                                        <p:cTn id="38" dur="1" fill="hold">
+                                          <p:stCondLst>
+                                            <p:cond delay="0"/>
+                                          </p:stCondLst>
+                                        </p:cTn>
+                                        <p:tgtEl>
+                                          <p:spTgt spid="13"/>
+                                        </p:tgtEl>
+                                        <p:attrNameLst>
+                                          <p:attrName>style.visibility</p:attrName>
+                                        </p:attrNameLst>
+                                      </p:cBhvr>
+                                      <p:to>
+                                        <p:strVal val="visible"/>
+                                      </p:to>
+                                    </p:set>
+                                    <p:animEffect transition="in" filter="wipe(down)">
+                                      <p:cBhvr>
+                                        <p:cTn id="39" dur="580">
+                                          <p:stCondLst>
+                                            <p:cond delay="0"/>
+                                          </p:stCondLst>
+                                        </p:cTn>
+                                        <p:tgtEl>
+                                          <p:spTgt spid="13"/>
+                                        </p:tgtEl>
+                                      </p:cBhvr>
+                                    </p:animEffect>
+                                    <p:anim calcmode="lin" valueType="num">
+                                      <p:cBhvr>
+                                        <p:cTn id="40" dur="1822" tmFilter="0,0; 0.14,0.36; 0.43,0.73; 0.71,0.91; 1.0,1.0">
+                                          <p:stCondLst>
+                                            <p:cond delay="0"/>
+                                          </p:stCondLst>
+                                        </p:cTn>
+                                        <p:tgtEl>
+                                          <p:spTgt spid="13"/>
+                                        </p:tgtEl>
+                                        <p:attrNameLst>
+                                          <p:attrName>ppt_x</p:attrName>
+                                        </p:attrNameLst>
+                                      </p:cBhvr>
+                                      <p:tavLst>
+                                        <p:tav tm="0">
+                                          <p:val>
+                                            <p:strVal val="#ppt_x-0.25"/>
+                                          </p:val>
+                                        </p:tav>
+                                        <p:tav tm="100000">
+                                          <p:val>
+                                            <p:strVal val="#ppt_x"/>
+                                          </p:val>
+                                        </p:tav>
+                                      </p:tavLst>
+                                    </p:anim>
+                                    <p:anim calcmode="lin" valueType="num">
+                                      <p:cBhvr>
+                                        <p:cTn id="41" dur="664" tmFilter="0.0,0.0; 0.25,0.07; 0.50,0.2; 0.75,0.467; 1.0,1.0">
+                                          <p:stCondLst>
+                                            <p:cond delay="0"/>
+                                          </p:stCondLst>
+                                        </p:cTn>
+                                        <p:tgtEl>
+                                          <p:spTgt spid="13"/>
+                                        </p:tgtEl>
+                                        <p:attrNameLst>
+                                          <p:attrName>ppt_y</p:attrName>
+                                        </p:attrNameLst>
+                                      </p:cBhvr>
+                                      <p:tavLst>
+                                        <p:tav tm="0" fmla="#ppt_y-sin(pi*$)/3">
+                                          <p:val>
+                                            <p:fltVal val="0.5"/>
+                                          </p:val>
+                                        </p:tav>
+                                        <p:tav tm="100000">
+                                          <p:val>
+                                            <p:fltVal val="1"/>
+                                          </p:val>
+                                        </p:tav>
+                                      </p:tavLst>
+                                    </p:anim>
+                                    <p:anim calcmode="lin" valueType="num">
+                                      <p:cBhvr>
+                                        <p:cTn id="42" dur="664" tmFilter="0, 0; 0.125,0.2665; 0.25,0.4; 0.375,0.465; 0.5,0.5;  0.625,0.535; 0.75,0.6; 0.875,0.7335; 1,1">
+                                          <p:stCondLst>
+                                            <p:cond delay="664"/>
+                                          </p:stCondLst>
+                                        </p:cTn>
+                                        <p:tgtEl>
+                                          <p:spTgt spid="13"/>
+                                        </p:tgtEl>
+                                        <p:attrNameLst>
+                                          <p:attrName>ppt_y</p:attrName>
+                                        </p:attrNameLst>
+                                      </p:cBhvr>
+                                      <p:tavLst>
+                                        <p:tav tm="0" fmla="#ppt_y-sin(pi*$)/9">
+                                          <p:val>
+                                            <p:fltVal val="0"/>
+                                          </p:val>
+                                        </p:tav>
+                                        <p:tav tm="100000">
+                                          <p:val>
+                                            <p:fltVal val="1"/>
+                                          </p:val>
+                                        </p:tav>
+                                      </p:tavLst>
+                                    </p:anim>
+                                    <p:anim calcmode="lin" valueType="num">
+                                      <p:cBhvr>
+                                        <p:cTn id="43" dur="332" tmFilter="0, 0; 0.125,0.2665; 0.25,0.4; 0.375,0.465; 0.5,0.5;  0.625,0.535; 0.75,0.6; 0.875,0.7335; 1,1">
+                                          <p:stCondLst>
+                                            <p:cond delay="1324"/>
+                                          </p:stCondLst>
+                                        </p:cTn>
+                                        <p:tgtEl>
+                                          <p:spTgt spid="13"/>
+                                        </p:tgtEl>
+                                        <p:attrNameLst>
+                                          <p:attrName>ppt_y</p:attrName>
+                                        </p:attrNameLst>
+                                      </p:cBhvr>
+                                      <p:tavLst>
+                                        <p:tav tm="0" fmla="#ppt_y-sin(pi*$)/27">
+                                          <p:val>
+                                            <p:fltVal val="0"/>
+                                          </p:val>
+                                        </p:tav>
+                                        <p:tav tm="100000">
+                                          <p:val>
+                                            <p:fltVal val="1"/>
+                                          </p:val>
+                                        </p:tav>
+                                      </p:tavLst>
+                                    </p:anim>
+                                    <p:anim calcmode="lin" valueType="num">
+                                      <p:cBhvr>
+                                        <p:cTn id="44" dur="164" tmFilter="0, 0; 0.125,0.2665; 0.25,0.4; 0.375,0.465; 0.5,0.5;  0.625,0.535; 0.75,0.6; 0.875,0.7335; 1,1">
+                                          <p:stCondLst>
+                                            <p:cond delay="1656"/>
+                                          </p:stCondLst>
+                                        </p:cTn>
+                                        <p:tgtEl>
+                                          <p:spTgt spid="13"/>
+                                        </p:tgtEl>
+                                        <p:attrNameLst>
+                                          <p:attrName>ppt_y</p:attrName>
+                                        </p:attrNameLst>
+                                      </p:cBhvr>
+                                      <p:tavLst>
+                                        <p:tav tm="0" fmla="#ppt_y-sin(pi*$)/81">
+                                          <p:val>
+                                            <p:fltVal val="0"/>
+                                          </p:val>
+                                        </p:tav>
+                                        <p:tav tm="100000">
+                                          <p:val>
+                                            <p:fltVal val="1"/>
+                                          </p:val>
+                                        </p:tav>
+                                      </p:tavLst>
+                                    </p:anim>
+                                    <p:animScale>
+                                      <p:cBhvr>
+                                        <p:cTn id="45" dur="26">
+                                          <p:stCondLst>
+                                            <p:cond delay="650"/>
+                                          </p:stCondLst>
+                                        </p:cTn>
+                                        <p:tgtEl>
+                                          <p:spTgt spid="13"/>
+                                        </p:tgtEl>
+                                      </p:cBhvr>
+                                      <p:to x="100000" y="60000"/>
+                                    </p:animScale>
+                                    <p:animScale>
+                                      <p:cBhvr>
+                                        <p:cTn id="46" dur="166" decel="50000">
+                                          <p:stCondLst>
+                                            <p:cond delay="676"/>
+                                          </p:stCondLst>
+                                        </p:cTn>
+                                        <p:tgtEl>
+                                          <p:spTgt spid="13"/>
+                                        </p:tgtEl>
+                                      </p:cBhvr>
+                                      <p:to x="100000" y="100000"/>
+                                    </p:animScale>
+                                    <p:animScale>
+                                      <p:cBhvr>
+                                        <p:cTn id="47" dur="26">
+                                          <p:stCondLst>
+                                            <p:cond delay="1312"/>
+                                          </p:stCondLst>
+                                        </p:cTn>
+                                        <p:tgtEl>
+                                          <p:spTgt spid="13"/>
+                                        </p:tgtEl>
+                                      </p:cBhvr>
+                                      <p:to x="100000" y="80000"/>
+                                    </p:animScale>
+                                    <p:animScale>
+                                      <p:cBhvr>
+                                        <p:cTn id="48" dur="166" decel="50000">
+                                          <p:stCondLst>
+                                            <p:cond delay="1338"/>
+                                          </p:stCondLst>
+                                        </p:cTn>
+                                        <p:tgtEl>
+                                          <p:spTgt spid="13"/>
+                                        </p:tgtEl>
+                                      </p:cBhvr>
+                                      <p:to x="100000" y="100000"/>
+                                    </p:animScale>
+                                    <p:animScale>
+                                      <p:cBhvr>
+                                        <p:cTn id="49" dur="26">
+                                          <p:stCondLst>
+                                            <p:cond delay="1642"/>
+                                          </p:stCondLst>
+                                        </p:cTn>
+                                        <p:tgtEl>
+                                          <p:spTgt spid="13"/>
+                                        </p:tgtEl>
+                                      </p:cBhvr>
+                                      <p:to x="100000" y="90000"/>
+                                    </p:animScale>
+                                    <p:animScale>
+                                      <p:cBhvr>
+                                        <p:cTn id="50" dur="166" decel="50000">
+                                          <p:stCondLst>
+                                            <p:cond delay="1668"/>
+                                          </p:stCondLst>
+                                        </p:cTn>
+                                        <p:tgtEl>
+                                          <p:spTgt spid="13"/>
+                                        </p:tgtEl>
+                                      </p:cBhvr>
+                                      <p:to x="100000" y="100000"/>
+                                    </p:animScale>
+                                    <p:animScale>
+                                      <p:cBhvr>
+                                        <p:cTn id="51" dur="26">
+                                          <p:stCondLst>
+                                            <p:cond delay="1808"/>
+                                          </p:stCondLst>
+                                        </p:cTn>
+                                        <p:tgtEl>
+                                          <p:spTgt spid="13"/>
+                                        </p:tgtEl>
+                                      </p:cBhvr>
+                                      <p:to x="100000" y="95000"/>
+                                    </p:animScale>
+                                    <p:animScale>
+                                      <p:cBhvr>
+                                        <p:cTn id="52" dur="166" decel="50000">
+                                          <p:stCondLst>
+                                            <p:cond delay="1834"/>
+                                          </p:stCondLst>
+                                        </p:cTn>
+                                        <p:tgtEl>
+                                          <p:spTgt spid="13"/>
+                                        </p:tgtEl>
+                                      </p:cBhvr>
+                                      <p:to x="100000" y="100000"/>
+                                    </p:animScale>
+                                  </p:childTnLst>
+                                </p:cTn>
+                              </p:par>
+                              <p:par>
+                                <p:cTn id="53" presetID="26" presetClass="entr" presetSubtype="0" fill="hold" nodeType="withEffect">
+                                  <p:stCondLst>
+                                    <p:cond delay="0"/>
+                                  </p:stCondLst>
+                                  <p:childTnLst>
+                                    <p:set>
+                                      <p:cBhvr>
+                                        <p:cTn id="54" dur="1" fill="hold">
+                                          <p:stCondLst>
+                                            <p:cond delay="0"/>
+                                          </p:stCondLst>
+                                        </p:cTn>
+                                        <p:tgtEl>
+                                          <p:spTgt spid="14"/>
+                                        </p:tgtEl>
+                                        <p:attrNameLst>
+                                          <p:attrName>style.visibility</p:attrName>
+                                        </p:attrNameLst>
+                                      </p:cBhvr>
+                                      <p:to>
+                                        <p:strVal val="visible"/>
+                                      </p:to>
+                                    </p:set>
+                                    <p:animEffect transition="in" filter="wipe(down)">
+                                      <p:cBhvr>
+                                        <p:cTn id="55" dur="580">
+                                          <p:stCondLst>
+                                            <p:cond delay="0"/>
+                                          </p:stCondLst>
+                                        </p:cTn>
+                                        <p:tgtEl>
+                                          <p:spTgt spid="14"/>
+                                        </p:tgtEl>
+                                      </p:cBhvr>
+                                    </p:animEffect>
+                                    <p:anim calcmode="lin" valueType="num">
+                                      <p:cBhvr>
+                                        <p:cTn id="56" dur="1822" tmFilter="0,0; 0.14,0.36; 0.43,0.73; 0.71,0.91; 1.0,1.0">
+                                          <p:stCondLst>
+                                            <p:cond delay="0"/>
+                                          </p:stCondLst>
+                                        </p:cTn>
+                                        <p:tgtEl>
+                                          <p:spTgt spid="14"/>
+                                        </p:tgtEl>
+                                        <p:attrNameLst>
+                                          <p:attrName>ppt_x</p:attrName>
+                                        </p:attrNameLst>
+                                      </p:cBhvr>
+                                      <p:tavLst>
+                                        <p:tav tm="0">
+                                          <p:val>
+                                            <p:strVal val="#ppt_x-0.25"/>
+                                          </p:val>
+                                        </p:tav>
+                                        <p:tav tm="100000">
+                                          <p:val>
+                                            <p:strVal val="#ppt_x"/>
+                                          </p:val>
+                                        </p:tav>
+                                      </p:tavLst>
+                                    </p:anim>
+                                    <p:anim calcmode="lin" valueType="num">
+                                      <p:cBhvr>
+                                        <p:cTn id="57" dur="664" tmFilter="0.0,0.0; 0.25,0.07; 0.50,0.2; 0.75,0.467; 1.0,1.0">
+                                          <p:stCondLst>
+                                            <p:cond delay="0"/>
+                                          </p:stCondLst>
+                                        </p:cTn>
+                                        <p:tgtEl>
+                                          <p:spTgt spid="14"/>
+                                        </p:tgtEl>
+                                        <p:attrNameLst>
+                                          <p:attrName>ppt_y</p:attrName>
+                                        </p:attrNameLst>
+                                      </p:cBhvr>
+                                      <p:tavLst>
+                                        <p:tav tm="0" fmla="#ppt_y-sin(pi*$)/3">
+                                          <p:val>
+                                            <p:fltVal val="0.5"/>
+                                          </p:val>
+                                        </p:tav>
+                                        <p:tav tm="100000">
+                                          <p:val>
+                                            <p:fltVal val="1"/>
+                                          </p:val>
+                                        </p:tav>
+                                      </p:tavLst>
+                                    </p:anim>
+                                    <p:anim calcmode="lin" valueType="num">
+                                      <p:cBhvr>
+                                        <p:cTn id="58" dur="664" tmFilter="0, 0; 0.125,0.2665; 0.25,0.4; 0.375,0.465; 0.5,0.5;  0.625,0.535; 0.75,0.6; 0.875,0.7335; 1,1">
+                                          <p:stCondLst>
+                                            <p:cond delay="664"/>
+                                          </p:stCondLst>
+                                        </p:cTn>
+                                        <p:tgtEl>
+                                          <p:spTgt spid="14"/>
+                                        </p:tgtEl>
+                                        <p:attrNameLst>
+                                          <p:attrName>ppt_y</p:attrName>
+                                        </p:attrNameLst>
+                                      </p:cBhvr>
+                                      <p:tavLst>
+                                        <p:tav tm="0" fmla="#ppt_y-sin(pi*$)/9">
+                                          <p:val>
+                                            <p:fltVal val="0"/>
+                                          </p:val>
+                                        </p:tav>
+                                        <p:tav tm="100000">
+                                          <p:val>
+                                            <p:fltVal val="1"/>
+                                          </p:val>
+                                        </p:tav>
+                                      </p:tavLst>
+                                    </p:anim>
+                                    <p:anim calcmode="lin" valueType="num">
+                                      <p:cBhvr>
+                                        <p:cTn id="59" dur="332" tmFilter="0, 0; 0.125,0.2665; 0.25,0.4; 0.375,0.465; 0.5,0.5;  0.625,0.535; 0.75,0.6; 0.875,0.7335; 1,1">
+                                          <p:stCondLst>
+                                            <p:cond delay="1324"/>
+                                          </p:stCondLst>
+                                        </p:cTn>
+                                        <p:tgtEl>
+                                          <p:spTgt spid="14"/>
+                                        </p:tgtEl>
+                                        <p:attrNameLst>
+                                          <p:attrName>ppt_y</p:attrName>
+                                        </p:attrNameLst>
+                                      </p:cBhvr>
+                                      <p:tavLst>
+                                        <p:tav tm="0" fmla="#ppt_y-sin(pi*$)/27">
+                                          <p:val>
+                                            <p:fltVal val="0"/>
+                                          </p:val>
+                                        </p:tav>
+                                        <p:tav tm="100000">
+                                          <p:val>
+                                            <p:fltVal val="1"/>
+                                          </p:val>
+                                        </p:tav>
+                                      </p:tavLst>
+                                    </p:anim>
+                                    <p:anim calcmode="lin" valueType="num">
+                                      <p:cBhvr>
+                                        <p:cTn id="60" dur="164" tmFilter="0, 0; 0.125,0.2665; 0.25,0.4; 0.375,0.465; 0.5,0.5;  0.625,0.535; 0.75,0.6; 0.875,0.7335; 1,1">
+                                          <p:stCondLst>
+                                            <p:cond delay="1656"/>
+                                          </p:stCondLst>
+                                        </p:cTn>
+                                        <p:tgtEl>
+                                          <p:spTgt spid="14"/>
+                                        </p:tgtEl>
+                                        <p:attrNameLst>
+                                          <p:attrName>ppt_y</p:attrName>
+                                        </p:attrNameLst>
+                                      </p:cBhvr>
+                                      <p:tavLst>
+                                        <p:tav tm="0" fmla="#ppt_y-sin(pi*$)/81">
+                                          <p:val>
+                                            <p:fltVal val="0"/>
+                                          </p:val>
+                                        </p:tav>
+                                        <p:tav tm="100000">
+                                          <p:val>
+                                            <p:fltVal val="1"/>
+                                          </p:val>
+                                        </p:tav>
+                                      </p:tavLst>
+                                    </p:anim>
+                                    <p:animScale>
+                                      <p:cBhvr>
+                                        <p:cTn id="61" dur="26">
+                                          <p:stCondLst>
+                                            <p:cond delay="650"/>
+                                          </p:stCondLst>
+                                        </p:cTn>
+                                        <p:tgtEl>
+                                          <p:spTgt spid="14"/>
+                                        </p:tgtEl>
+                                      </p:cBhvr>
+                                      <p:to x="100000" y="60000"/>
+                                    </p:animScale>
+                                    <p:animScale>
+                                      <p:cBhvr>
+                                        <p:cTn id="62" dur="166" decel="50000">
+                                          <p:stCondLst>
+                                            <p:cond delay="676"/>
+                                          </p:stCondLst>
+                                        </p:cTn>
+                                        <p:tgtEl>
+                                          <p:spTgt spid="14"/>
+                                        </p:tgtEl>
+                                      </p:cBhvr>
+                                      <p:to x="100000" y="100000"/>
+                                    </p:animScale>
+                                    <p:animScale>
+                                      <p:cBhvr>
+                                        <p:cTn id="63" dur="26">
+                                          <p:stCondLst>
+                                            <p:cond delay="1312"/>
+                                          </p:stCondLst>
+                                        </p:cTn>
+                                        <p:tgtEl>
+                                          <p:spTgt spid="14"/>
+                                        </p:tgtEl>
+                                      </p:cBhvr>
+                                      <p:to x="100000" y="80000"/>
+                                    </p:animScale>
+                                    <p:animScale>
+                                      <p:cBhvr>
+                                        <p:cTn id="64" dur="166" decel="50000">
+                                          <p:stCondLst>
+                                            <p:cond delay="1338"/>
+                                          </p:stCondLst>
+                                        </p:cTn>
+                                        <p:tgtEl>
+                                          <p:spTgt spid="14"/>
+                                        </p:tgtEl>
+                                      </p:cBhvr>
+                                      <p:to x="100000" y="100000"/>
+                                    </p:animScale>
+                                    <p:animScale>
+                                      <p:cBhvr>
+                                        <p:cTn id="65" dur="26">
+                                          <p:stCondLst>
+                                            <p:cond delay="1642"/>
+                                          </p:stCondLst>
+                                        </p:cTn>
+                                        <p:tgtEl>
+                                          <p:spTgt spid="14"/>
+                                        </p:tgtEl>
+                                      </p:cBhvr>
+                                      <p:to x="100000" y="90000"/>
+                                    </p:animScale>
+                                    <p:animScale>
+                                      <p:cBhvr>
+                                        <p:cTn id="66" dur="166" decel="50000">
+                                          <p:stCondLst>
+                                            <p:cond delay="1668"/>
+                                          </p:stCondLst>
+                                        </p:cTn>
+                                        <p:tgtEl>
+                                          <p:spTgt spid="14"/>
+                                        </p:tgtEl>
+                                      </p:cBhvr>
+                                      <p:to x="100000" y="100000"/>
+                                    </p:animScale>
+                                    <p:animScale>
+                                      <p:cBhvr>
+                                        <p:cTn id="67" dur="26">
+                                          <p:stCondLst>
+                                            <p:cond delay="1808"/>
+                                          </p:stCondLst>
+                                        </p:cTn>
+                                        <p:tgtEl>
+                                          <p:spTgt spid="14"/>
+                                        </p:tgtEl>
+                                      </p:cBhvr>
+                                      <p:to x="100000" y="95000"/>
+                                    </p:animScale>
+                                    <p:animScale>
+                                      <p:cBhvr>
+                                        <p:cTn id="68" dur="166" decel="50000">
+                                          <p:stCondLst>
+                                            <p:cond delay="1834"/>
+                                          </p:stCondLst>
+                                        </p:cTn>
+                                        <p:tgtEl>
+                                          <p:spTgt spid="14"/>
+                                        </p:tgtEl>
+                                      </p:cBhvr>
+                                      <p:to x="100000" y="100000"/>
+                                    </p:animScale>
+                                  </p:childTnLst>
+                                </p:cTn>
+                              </p:par>
+                              <p:par>
+                                <p:cTn id="69" presetID="26" presetClass="entr" presetSubtype="0" fill="hold" nodeType="withEffect">
+                                  <p:stCondLst>
+                                    <p:cond delay="0"/>
+                                  </p:stCondLst>
+                                  <p:childTnLst>
+                                    <p:set>
+                                      <p:cBhvr>
+                                        <p:cTn id="70" dur="1" fill="hold">
+                                          <p:stCondLst>
+                                            <p:cond delay="0"/>
+                                          </p:stCondLst>
+                                        </p:cTn>
+                                        <p:tgtEl>
+                                          <p:spTgt spid="10"/>
+                                        </p:tgtEl>
+                                        <p:attrNameLst>
+                                          <p:attrName>style.visibility</p:attrName>
+                                        </p:attrNameLst>
+                                      </p:cBhvr>
+                                      <p:to>
+                                        <p:strVal val="visible"/>
+                                      </p:to>
+                                    </p:set>
+                                    <p:animEffect transition="in" filter="wipe(down)">
+                                      <p:cBhvr>
+                                        <p:cTn id="71" dur="580">
+                                          <p:stCondLst>
+                                            <p:cond delay="0"/>
+                                          </p:stCondLst>
+                                        </p:cTn>
+                                        <p:tgtEl>
+                                          <p:spTgt spid="10"/>
+                                        </p:tgtEl>
+                                      </p:cBhvr>
+                                    </p:animEffect>
+                                    <p:anim calcmode="lin" valueType="num">
+                                      <p:cBhvr>
+                                        <p:cTn id="72" dur="1822" tmFilter="0,0; 0.14,0.36; 0.43,0.73; 0.71,0.91; 1.0,1.0">
+                                          <p:stCondLst>
+                                            <p:cond delay="0"/>
+                                          </p:stCondLst>
+                                        </p:cTn>
+                                        <p:tgtEl>
+                                          <p:spTgt spid="10"/>
+                                        </p:tgtEl>
+                                        <p:attrNameLst>
+                                          <p:attrName>ppt_x</p:attrName>
+                                        </p:attrNameLst>
+                                      </p:cBhvr>
+                                      <p:tavLst>
+                                        <p:tav tm="0">
+                                          <p:val>
+                                            <p:strVal val="#ppt_x-0.25"/>
+                                          </p:val>
+                                        </p:tav>
+                                        <p:tav tm="100000">
+                                          <p:val>
+                                            <p:strVal val="#ppt_x"/>
+                                          </p:val>
+                                        </p:tav>
+                                      </p:tavLst>
+                                    </p:anim>
+                                    <p:anim calcmode="lin" valueType="num">
+                                      <p:cBhvr>
+                                        <p:cTn id="73" dur="664" tmFilter="0.0,0.0; 0.25,0.07; 0.50,0.2; 0.75,0.467; 1.0,1.0">
+                                          <p:stCondLst>
+                                            <p:cond delay="0"/>
+                                          </p:stCondLst>
+                                        </p:cTn>
+                                        <p:tgtEl>
+                                          <p:spTgt spid="10"/>
+                                        </p:tgtEl>
+                                        <p:attrNameLst>
+                                          <p:attrName>ppt_y</p:attrName>
+                                        </p:attrNameLst>
+                                      </p:cBhvr>
+                                      <p:tavLst>
+                                        <p:tav tm="0" fmla="#ppt_y-sin(pi*$)/3">
+                                          <p:val>
+                                            <p:fltVal val="0.5"/>
+                                          </p:val>
+                                        </p:tav>
+                                        <p:tav tm="100000">
+                                          <p:val>
+                                            <p:fltVal val="1"/>
+                                          </p:val>
+                                        </p:tav>
+                                      </p:tavLst>
+                                    </p:anim>
+                                    <p:anim calcmode="lin" valueType="num">
+                                      <p:cBhvr>
+                                        <p:cTn id="74" dur="664" tmFilter="0, 0; 0.125,0.2665; 0.25,0.4; 0.375,0.465; 0.5,0.5;  0.625,0.535; 0.75,0.6; 0.875,0.7335; 1,1">
+                                          <p:stCondLst>
+                                            <p:cond delay="664"/>
+                                          </p:stCondLst>
+                                        </p:cTn>
+                                        <p:tgtEl>
+                                          <p:spTgt spid="10"/>
+                                        </p:tgtEl>
+                                        <p:attrNameLst>
+                                          <p:attrName>ppt_y</p:attrName>
+                                        </p:attrNameLst>
+                                      </p:cBhvr>
+                                      <p:tavLst>
+                                        <p:tav tm="0" fmla="#ppt_y-sin(pi*$)/9">
+                                          <p:val>
+                                            <p:fltVal val="0"/>
+                                          </p:val>
+                                        </p:tav>
+                                        <p:tav tm="100000">
+                                          <p:val>
+                                            <p:fltVal val="1"/>
+                                          </p:val>
+                                        </p:tav>
+                                      </p:tavLst>
+                                    </p:anim>
+                                    <p:anim calcmode="lin" valueType="num">
+                                      <p:cBhvr>
+                                        <p:cTn id="75" dur="332" tmFilter="0, 0; 0.125,0.2665; 0.25,0.4; 0.375,0.465; 0.5,0.5;  0.625,0.535; 0.75,0.6; 0.875,0.7335; 1,1">
+                                          <p:stCondLst>
+                                            <p:cond delay="1324"/>
+                                          </p:stCondLst>
+                                        </p:cTn>
+                                        <p:tgtEl>
+                                          <p:spTgt spid="10"/>
+                                        </p:tgtEl>
+                                        <p:attrNameLst>
+                                          <p:attrName>ppt_y</p:attrName>
+                                        </p:attrNameLst>
+                                      </p:cBhvr>
+                                      <p:tavLst>
+                                        <p:tav tm="0" fmla="#ppt_y-sin(pi*$)/27">
+                                          <p:val>
+                                            <p:fltVal val="0"/>
+                                          </p:val>
+                                        </p:tav>
+                                        <p:tav tm="100000">
+                                          <p:val>
+                                            <p:fltVal val="1"/>
+                                          </p:val>
+                                        </p:tav>
+                                      </p:tavLst>
+                                    </p:anim>
+                                    <p:anim calcmode="lin" valueType="num">
+                                      <p:cBhvr>
+                                        <p:cTn id="76" dur="164" tmFilter="0, 0; 0.125,0.2665; 0.25,0.4; 0.375,0.465; 0.5,0.5;  0.625,0.535; 0.75,0.6; 0.875,0.7335; 1,1">
+                                          <p:stCondLst>
+                                            <p:cond delay="1656"/>
+                                          </p:stCondLst>
+                                        </p:cTn>
+                                        <p:tgtEl>
+                                          <p:spTgt spid="10"/>
+                                        </p:tgtEl>
+                                        <p:attrNameLst>
+                                          <p:attrName>ppt_y</p:attrName>
+                                        </p:attrNameLst>
+                                      </p:cBhvr>
+                                      <p:tavLst>
+                                        <p:tav tm="0" fmla="#ppt_y-sin(pi*$)/81">
+                                          <p:val>
+                                            <p:fltVal val="0"/>
+                                          </p:val>
+                                        </p:tav>
+                                        <p:tav tm="100000">
+                                          <p:val>
+                                            <p:fltVal val="1"/>
+                                          </p:val>
+                                        </p:tav>
+                                      </p:tavLst>
+                                    </p:anim>
+                                    <p:animScale>
+                                      <p:cBhvr>
+                                        <p:cTn id="77" dur="26">
+                                          <p:stCondLst>
+                                            <p:cond delay="650"/>
+                                          </p:stCondLst>
+                                        </p:cTn>
+                                        <p:tgtEl>
+                                          <p:spTgt spid="10"/>
+                                        </p:tgtEl>
+                                      </p:cBhvr>
+                                      <p:to x="100000" y="60000"/>
+                                    </p:animScale>
+                                    <p:animScale>
+                                      <p:cBhvr>
+                                        <p:cTn id="78" dur="166" decel="50000">
+                                          <p:stCondLst>
+                                            <p:cond delay="676"/>
+                                          </p:stCondLst>
+                                        </p:cTn>
+                                        <p:tgtEl>
+                                          <p:spTgt spid="10"/>
+                                        </p:tgtEl>
+                                      </p:cBhvr>
+                                      <p:to x="100000" y="100000"/>
+                                    </p:animScale>
+                                    <p:animScale>
+                                      <p:cBhvr>
+                                        <p:cTn id="79" dur="26">
+                                          <p:stCondLst>
+                                            <p:cond delay="1312"/>
+                                          </p:stCondLst>
+                                        </p:cTn>
+                                        <p:tgtEl>
+                                          <p:spTgt spid="10"/>
+                                        </p:tgtEl>
+                                      </p:cBhvr>
+                                      <p:to x="100000" y="80000"/>
+                                    </p:animScale>
+                                    <p:animScale>
+                                      <p:cBhvr>
+                                        <p:cTn id="80" dur="166" decel="50000">
+                                          <p:stCondLst>
+                                            <p:cond delay="1338"/>
+                                          </p:stCondLst>
+                                        </p:cTn>
+                                        <p:tgtEl>
+                                          <p:spTgt spid="10"/>
+                                        </p:tgtEl>
+                                      </p:cBhvr>
+                                      <p:to x="100000" y="100000"/>
+                                    </p:animScale>
+                                    <p:animScale>
+                                      <p:cBhvr>
+                                        <p:cTn id="81" dur="26">
+                                          <p:stCondLst>
+                                            <p:cond delay="1642"/>
+                                          </p:stCondLst>
+                                        </p:cTn>
+                                        <p:tgtEl>
+                                          <p:spTgt spid="10"/>
+                                        </p:tgtEl>
+                                      </p:cBhvr>
+                                      <p:to x="100000" y="90000"/>
+                                    </p:animScale>
+                                    <p:animScale>
+                                      <p:cBhvr>
+                                        <p:cTn id="82" dur="166" decel="50000">
+                                          <p:stCondLst>
+                                            <p:cond delay="1668"/>
+                                          </p:stCondLst>
+                                        </p:cTn>
+                                        <p:tgtEl>
+                                          <p:spTgt spid="10"/>
+                                        </p:tgtEl>
+                                      </p:cBhvr>
+                                      <p:to x="100000" y="100000"/>
+                                    </p:animScale>
+                                    <p:animScale>
+                                      <p:cBhvr>
+                                        <p:cTn id="83" dur="26">
+                                          <p:stCondLst>
+                                            <p:cond delay="1808"/>
+                                          </p:stCondLst>
+                                        </p:cTn>
+                                        <p:tgtEl>
+                                          <p:spTgt spid="10"/>
+                                        </p:tgtEl>
+                                      </p:cBhvr>
+                                      <p:to x="100000" y="95000"/>
+                                    </p:animScale>
+                                    <p:animScale>
+                                      <p:cBhvr>
+                                        <p:cTn id="84" dur="166" decel="50000">
+                                          <p:stCondLst>
+                                            <p:cond delay="1834"/>
+                                          </p:stCondLst>
+                                        </p:cTn>
+                                        <p:tgtEl>
+                                          <p:spTgt spid="10"/>
+                                        </p:tgtEl>
+                                      </p:cBhvr>
+                                      <p:to x="100000" y="100000"/>
+                                    </p:animScale>
+                                  </p:childTnLst>
+                                </p:cTn>
+                              </p:par>
+                              <p:par>
+                                <p:cTn id="85" presetID="26" presetClass="entr" presetSubtype="0" fill="hold" nodeType="withEffect">
+                                  <p:stCondLst>
+                                    <p:cond delay="0"/>
+                                  </p:stCondLst>
+                                  <p:childTnLst>
+                                    <p:set>
+                                      <p:cBhvr>
+                                        <p:cTn id="86" dur="1" fill="hold">
+                                          <p:stCondLst>
+                                            <p:cond delay="0"/>
+                                          </p:stCondLst>
+                                        </p:cTn>
+                                        <p:tgtEl>
+                                          <p:spTgt spid="7"/>
+                                        </p:tgtEl>
+                                        <p:attrNameLst>
+                                          <p:attrName>style.visibility</p:attrName>
+                                        </p:attrNameLst>
+                                      </p:cBhvr>
+                                      <p:to>
+                                        <p:strVal val="visible"/>
+                                      </p:to>
+                                    </p:set>
+                                    <p:animEffect transition="in" filter="wipe(down)">
+                                      <p:cBhvr>
+                                        <p:cTn id="87" dur="580">
+                                          <p:stCondLst>
+                                            <p:cond delay="0"/>
+                                          </p:stCondLst>
+                                        </p:cTn>
+                                        <p:tgtEl>
+                                          <p:spTgt spid="7"/>
+                                        </p:tgtEl>
+                                      </p:cBhvr>
+                                    </p:animEffect>
+                                    <p:anim calcmode="lin" valueType="num">
+                                      <p:cBhvr>
+                                        <p:cTn id="88" dur="1822" tmFilter="0,0; 0.14,0.36; 0.43,0.73; 0.71,0.91; 1.0,1.0">
+                                          <p:stCondLst>
+                                            <p:cond delay="0"/>
+                                          </p:stCondLst>
+                                        </p:cTn>
+                                        <p:tgtEl>
+                                          <p:spTgt spid="7"/>
+                                        </p:tgtEl>
+                                        <p:attrNameLst>
+                                          <p:attrName>ppt_x</p:attrName>
+                                        </p:attrNameLst>
+                                      </p:cBhvr>
+                                      <p:tavLst>
+                                        <p:tav tm="0">
+                                          <p:val>
+                                            <p:strVal val="#ppt_x-0.25"/>
+                                          </p:val>
+                                        </p:tav>
+                                        <p:tav tm="100000">
+                                          <p:val>
+                                            <p:strVal val="#ppt_x"/>
+                                          </p:val>
+                                        </p:tav>
+                                      </p:tavLst>
+                                    </p:anim>
+                                    <p:anim calcmode="lin" valueType="num">
+                                      <p:cBhvr>
+                                        <p:cTn id="89" dur="664" tmFilter="0.0,0.0; 0.25,0.07; 0.50,0.2; 0.75,0.467; 1.0,1.0">
+                                          <p:stCondLst>
+                                            <p:cond delay="0"/>
+                                          </p:stCondLst>
+                                        </p:cTn>
+                                        <p:tgtEl>
+                                          <p:spTgt spid="7"/>
+                                        </p:tgtEl>
+                                        <p:attrNameLst>
+                                          <p:attrName>ppt_y</p:attrName>
+                                        </p:attrNameLst>
+                                      </p:cBhvr>
+                                      <p:tavLst>
+                                        <p:tav tm="0" fmla="#ppt_y-sin(pi*$)/3">
+                                          <p:val>
+                                            <p:fltVal val="0.5"/>
+                                          </p:val>
+                                        </p:tav>
+                                        <p:tav tm="100000">
+                                          <p:val>
+                                            <p:fltVal val="1"/>
+                                          </p:val>
+                                        </p:tav>
+                                      </p:tavLst>
+                                    </p:anim>
+                                    <p:anim calcmode="lin" valueType="num">
+                                      <p:cBhvr>
+                                        <p:cTn id="90" dur="664" tmFilter="0, 0; 0.125,0.2665; 0.25,0.4; 0.375,0.465; 0.5,0.5;  0.625,0.535; 0.75,0.6; 0.875,0.7335; 1,1">
+                                          <p:stCondLst>
+                                            <p:cond delay="664"/>
+                                          </p:stCondLst>
+                                        </p:cTn>
+                                        <p:tgtEl>
+                                          <p:spTgt spid="7"/>
+                                        </p:tgtEl>
+                                        <p:attrNameLst>
+                                          <p:attrName>ppt_y</p:attrName>
+                                        </p:attrNameLst>
+                                      </p:cBhvr>
+                                      <p:tavLst>
+                                        <p:tav tm="0" fmla="#ppt_y-sin(pi*$)/9">
+                                          <p:val>
+                                            <p:fltVal val="0"/>
+                                          </p:val>
+                                        </p:tav>
+                                        <p:tav tm="100000">
+                                          <p:val>
+                                            <p:fltVal val="1"/>
+                                          </p:val>
+                                        </p:tav>
+                                      </p:tavLst>
+                                    </p:anim>
+                                    <p:anim calcmode="lin" valueType="num">
+                                      <p:cBhvr>
+                                        <p:cTn id="91" dur="332" tmFilter="0, 0; 0.125,0.2665; 0.25,0.4; 0.375,0.465; 0.5,0.5;  0.625,0.535; 0.75,0.6; 0.875,0.7335; 1,1">
+                                          <p:stCondLst>
+                                            <p:cond delay="1324"/>
+                                          </p:stCondLst>
+                                        </p:cTn>
+                                        <p:tgtEl>
+                                          <p:spTgt spid="7"/>
+                                        </p:tgtEl>
+                                        <p:attrNameLst>
+                                          <p:attrName>ppt_y</p:attrName>
+                                        </p:attrNameLst>
+                                      </p:cBhvr>
+                                      <p:tavLst>
+                                        <p:tav tm="0" fmla="#ppt_y-sin(pi*$)/27">
+                                          <p:val>
+                                            <p:fltVal val="0"/>
+                                          </p:val>
+                                        </p:tav>
+                                        <p:tav tm="100000">
+                                          <p:val>
+                                            <p:fltVal val="1"/>
+                                          </p:val>
+                                        </p:tav>
+                                      </p:tavLst>
+                                    </p:anim>
+                                    <p:anim calcmode="lin" valueType="num">
+                                      <p:cBhvr>
+                                        <p:cTn id="92" dur="164" tmFilter="0, 0; 0.125,0.2665; 0.25,0.4; 0.375,0.465; 0.5,0.5;  0.625,0.535; 0.75,0.6; 0.875,0.7335; 1,1">
+                                          <p:stCondLst>
+                                            <p:cond delay="1656"/>
+                                          </p:stCondLst>
+                                        </p:cTn>
+                                        <p:tgtEl>
+                                          <p:spTgt spid="7"/>
+                                        </p:tgtEl>
+                                        <p:attrNameLst>
+                                          <p:attrName>ppt_y</p:attrName>
+                                        </p:attrNameLst>
+                                      </p:cBhvr>
+                                      <p:tavLst>
+                                        <p:tav tm="0" fmla="#ppt_y-sin(pi*$)/81">
+                                          <p:val>
+                                            <p:fltVal val="0"/>
+                                          </p:val>
+                                        </p:tav>
+                                        <p:tav tm="100000">
+                                          <p:val>
+                                            <p:fltVal val="1"/>
+                                          </p:val>
+                                        </p:tav>
+                                      </p:tavLst>
+                                    </p:anim>
+                                    <p:animScale>
+                                      <p:cBhvr>
+                                        <p:cTn id="93" dur="26">
+                                          <p:stCondLst>
+                                            <p:cond delay="650"/>
+                                          </p:stCondLst>
+                                        </p:cTn>
+                                        <p:tgtEl>
+                                          <p:spTgt spid="7"/>
+                                        </p:tgtEl>
+                                      </p:cBhvr>
+                                      <p:to x="100000" y="60000"/>
+                                    </p:animScale>
+                                    <p:animScale>
+                                      <p:cBhvr>
+                                        <p:cTn id="94" dur="166" decel="50000">
+                                          <p:stCondLst>
+                                            <p:cond delay="676"/>
+                                          </p:stCondLst>
+                                        </p:cTn>
+                                        <p:tgtEl>
+                                          <p:spTgt spid="7"/>
+                                        </p:tgtEl>
+                                      </p:cBhvr>
+                                      <p:to x="100000" y="100000"/>
+                                    </p:animScale>
+                                    <p:animScale>
+                                      <p:cBhvr>
+                                        <p:cTn id="95" dur="26">
+                                          <p:stCondLst>
+                                            <p:cond delay="1312"/>
+                                          </p:stCondLst>
+                                        </p:cTn>
+                                        <p:tgtEl>
+                                          <p:spTgt spid="7"/>
+                                        </p:tgtEl>
+                                      </p:cBhvr>
+                                      <p:to x="100000" y="80000"/>
+                                    </p:animScale>
+                                    <p:animScale>
+                                      <p:cBhvr>
+                                        <p:cTn id="96" dur="166" decel="50000">
+                                          <p:stCondLst>
+                                            <p:cond delay="1338"/>
+                                          </p:stCondLst>
+                                        </p:cTn>
+                                        <p:tgtEl>
+                                          <p:spTgt spid="7"/>
+                                        </p:tgtEl>
+                                      </p:cBhvr>
+                                      <p:to x="100000" y="100000"/>
+                                    </p:animScale>
+                                    <p:animScale>
+                                      <p:cBhvr>
+                                        <p:cTn id="97" dur="26">
+                                          <p:stCondLst>
+                                            <p:cond delay="1642"/>
+                                          </p:stCondLst>
+                                        </p:cTn>
+                                        <p:tgtEl>
+                                          <p:spTgt spid="7"/>
+                                        </p:tgtEl>
+                                      </p:cBhvr>
+                                      <p:to x="100000" y="90000"/>
+                                    </p:animScale>
+                                    <p:animScale>
+                                      <p:cBhvr>
+                                        <p:cTn id="98" dur="166" decel="50000">
+                                          <p:stCondLst>
+                                            <p:cond delay="1668"/>
+                                          </p:stCondLst>
+                                        </p:cTn>
+                                        <p:tgtEl>
+                                          <p:spTgt spid="7"/>
+                                        </p:tgtEl>
+                                      </p:cBhvr>
+                                      <p:to x="100000" y="100000"/>
+                                    </p:animScale>
+                                    <p:animScale>
+                                      <p:cBhvr>
+                                        <p:cTn id="99" dur="26">
+                                          <p:stCondLst>
+                                            <p:cond delay="1808"/>
+                                          </p:stCondLst>
+                                        </p:cTn>
+                                        <p:tgtEl>
+                                          <p:spTgt spid="7"/>
+                                        </p:tgtEl>
+                                      </p:cBhvr>
+                                      <p:to x="100000" y="95000"/>
+                                    </p:animScale>
+                                    <p:animScale>
+                                      <p:cBhvr>
+                                        <p:cTn id="100" dur="166" decel="50000">
+                                          <p:stCondLst>
+                                            <p:cond delay="1834"/>
+                                          </p:stCondLst>
+                                        </p:cTn>
+                                        <p:tgtEl>
+                                          <p:spTgt spid="7"/>
+                                        </p:tgtEl>
+                                      </p:cBhvr>
+                                      <p:to x="100000" y="100000"/>
+                                    </p:animScale>
+                                  </p:childTnLst>
+                                </p:cTn>
+                              </p:par>
+                              <p:par>
+                                <p:cTn id="101" presetID="26" presetClass="entr" presetSubtype="0" fill="hold" nodeType="withEffect">
+                                  <p:stCondLst>
+                                    <p:cond delay="0"/>
+                                  </p:stCondLst>
+                                  <p:childTnLst>
+                                    <p:set>
+                                      <p:cBhvr>
+                                        <p:cTn id="102" dur="1" fill="hold">
+                                          <p:stCondLst>
+                                            <p:cond delay="0"/>
+                                          </p:stCondLst>
+                                        </p:cTn>
+                                        <p:tgtEl>
+                                          <p:spTgt spid="9"/>
+                                        </p:tgtEl>
+                                        <p:attrNameLst>
+                                          <p:attrName>style.visibility</p:attrName>
+                                        </p:attrNameLst>
+                                      </p:cBhvr>
+                                      <p:to>
+                                        <p:strVal val="visible"/>
+                                      </p:to>
+                                    </p:set>
+                                    <p:animEffect transition="in" filter="wipe(down)">
+                                      <p:cBhvr>
+                                        <p:cTn id="103" dur="580">
+                                          <p:stCondLst>
+                                            <p:cond delay="0"/>
+                                          </p:stCondLst>
+                                        </p:cTn>
+                                        <p:tgtEl>
+                                          <p:spTgt spid="9"/>
+                                        </p:tgtEl>
+                                      </p:cBhvr>
+                                    </p:animEffect>
+                                    <p:anim calcmode="lin" valueType="num">
+                                      <p:cBhvr>
+                                        <p:cTn id="104" dur="1822" tmFilter="0,0; 0.14,0.36; 0.43,0.73; 0.71,0.91; 1.0,1.0">
+                                          <p:stCondLst>
+                                            <p:cond delay="0"/>
+                                          </p:stCondLst>
+                                        </p:cTn>
+                                        <p:tgtEl>
+                                          <p:spTgt spid="9"/>
+                                        </p:tgtEl>
+                                        <p:attrNameLst>
+                                          <p:attrName>ppt_x</p:attrName>
+                                        </p:attrNameLst>
+                                      </p:cBhvr>
+                                      <p:tavLst>
+                                        <p:tav tm="0">
+                                          <p:val>
+                                            <p:strVal val="#ppt_x-0.25"/>
+                                          </p:val>
+                                        </p:tav>
+                                        <p:tav tm="100000">
+                                          <p:val>
+                                            <p:strVal val="#ppt_x"/>
+                                          </p:val>
+                                        </p:tav>
+                                      </p:tavLst>
+                                    </p:anim>
+                                    <p:anim calcmode="lin" valueType="num">
+                                      <p:cBhvr>
+                                        <p:cTn id="105" dur="664" tmFilter="0.0,0.0; 0.25,0.07; 0.50,0.2; 0.75,0.467; 1.0,1.0">
+                                          <p:stCondLst>
+                                            <p:cond delay="0"/>
+                                          </p:stCondLst>
+                                        </p:cTn>
+                                        <p:tgtEl>
+                                          <p:spTgt spid="9"/>
+                                        </p:tgtEl>
+                                        <p:attrNameLst>
+                                          <p:attrName>ppt_y</p:attrName>
+                                        </p:attrNameLst>
+                                      </p:cBhvr>
+                                      <p:tavLst>
+                                        <p:tav tm="0" fmla="#ppt_y-sin(pi*$)/3">
+                                          <p:val>
+                                            <p:fltVal val="0.5"/>
+                                          </p:val>
+                                        </p:tav>
+                                        <p:tav tm="100000">
+                                          <p:val>
+                                            <p:fltVal val="1"/>
+                                          </p:val>
+                                        </p:tav>
+                                      </p:tavLst>
+                                    </p:anim>
+                                    <p:anim calcmode="lin" valueType="num">
+                                      <p:cBhvr>
+                                        <p:cTn id="106" dur="664" tmFilter="0, 0; 0.125,0.2665; 0.25,0.4; 0.375,0.465; 0.5,0.5;  0.625,0.535; 0.75,0.6; 0.875,0.7335; 1,1">
+                                          <p:stCondLst>
+                                            <p:cond delay="664"/>
+                                          </p:stCondLst>
+                                        </p:cTn>
+                                        <p:tgtEl>
+                                          <p:spTgt spid="9"/>
+                                        </p:tgtEl>
+                                        <p:attrNameLst>
+                                          <p:attrName>ppt_y</p:attrName>
+                                        </p:attrNameLst>
+                                      </p:cBhvr>
+                                      <p:tavLst>
+                                        <p:tav tm="0" fmla="#ppt_y-sin(pi*$)/9">
+                                          <p:val>
+                                            <p:fltVal val="0"/>
+                                          </p:val>
+                                        </p:tav>
+                                        <p:tav tm="100000">
+                                          <p:val>
+                                            <p:fltVal val="1"/>
+                                          </p:val>
+                                        </p:tav>
+                                      </p:tavLst>
+                                    </p:anim>
+                                    <p:anim calcmode="lin" valueType="num">
+                                      <p:cBhvr>
+                                        <p:cTn id="107" dur="332" tmFilter="0, 0; 0.125,0.2665; 0.25,0.4; 0.375,0.465; 0.5,0.5;  0.625,0.535; 0.75,0.6; 0.875,0.7335; 1,1">
+                                          <p:stCondLst>
+                                            <p:cond delay="1324"/>
+                                          </p:stCondLst>
+                                        </p:cTn>
+                                        <p:tgtEl>
+                                          <p:spTgt spid="9"/>
+                                        </p:tgtEl>
+                                        <p:attrNameLst>
+                                          <p:attrName>ppt_y</p:attrName>
+                                        </p:attrNameLst>
+                                      </p:cBhvr>
+                                      <p:tavLst>
+                                        <p:tav tm="0" fmla="#ppt_y-sin(pi*$)/27">
+                                          <p:val>
+                                            <p:fltVal val="0"/>
+                                          </p:val>
+                                        </p:tav>
+                                        <p:tav tm="100000">
+                                          <p:val>
+                                            <p:fltVal val="1"/>
+                                          </p:val>
+                                        </p:tav>
+                                      </p:tavLst>
+                                    </p:anim>
+                                    <p:anim calcmode="lin" valueType="num">
+                                      <p:cBhvr>
+                                        <p:cTn id="108" dur="164" tmFilter="0, 0; 0.125,0.2665; 0.25,0.4; 0.375,0.465; 0.5,0.5;  0.625,0.535; 0.75,0.6; 0.875,0.7335; 1,1">
+                                          <p:stCondLst>
+                                            <p:cond delay="1656"/>
+                                          </p:stCondLst>
+                                        </p:cTn>
+                                        <p:tgtEl>
+                                          <p:spTgt spid="9"/>
+                                        </p:tgtEl>
+                                        <p:attrNameLst>
+                                          <p:attrName>ppt_y</p:attrName>
+                                        </p:attrNameLst>
+                                      </p:cBhvr>
+                                      <p:tavLst>
+                                        <p:tav tm="0" fmla="#ppt_y-sin(pi*$)/81">
+                                          <p:val>
+                                            <p:fltVal val="0"/>
+                                          </p:val>
+                                        </p:tav>
+                                        <p:tav tm="100000">
+                                          <p:val>
+                                            <p:fltVal val="1"/>
+                                          </p:val>
+                                        </p:tav>
+                                      </p:tavLst>
+                                    </p:anim>
+                                    <p:animScale>
+                                      <p:cBhvr>
+                                        <p:cTn id="109" dur="26">
+                                          <p:stCondLst>
+                                            <p:cond delay="650"/>
+                                          </p:stCondLst>
+                                        </p:cTn>
+                                        <p:tgtEl>
+                                          <p:spTgt spid="9"/>
+                                        </p:tgtEl>
+                                      </p:cBhvr>
+                                      <p:to x="100000" y="60000"/>
+                                    </p:animScale>
+                                    <p:animScale>
+                                      <p:cBhvr>
+                                        <p:cTn id="110" dur="166" decel="50000">
+                                          <p:stCondLst>
+                                            <p:cond delay="676"/>
+                                          </p:stCondLst>
+                                        </p:cTn>
+                                        <p:tgtEl>
+                                          <p:spTgt spid="9"/>
+                                        </p:tgtEl>
+                                      </p:cBhvr>
+                                      <p:to x="100000" y="100000"/>
+                                    </p:animScale>
+                                    <p:animScale>
+                                      <p:cBhvr>
+                                        <p:cTn id="111" dur="26">
+                                          <p:stCondLst>
+                                            <p:cond delay="1312"/>
+                                          </p:stCondLst>
+                                        </p:cTn>
+                                        <p:tgtEl>
+                                          <p:spTgt spid="9"/>
+                                        </p:tgtEl>
+                                      </p:cBhvr>
+                                      <p:to x="100000" y="80000"/>
+                                    </p:animScale>
+                                    <p:animScale>
+                                      <p:cBhvr>
+                                        <p:cTn id="112" dur="166" decel="50000">
+                                          <p:stCondLst>
+                                            <p:cond delay="1338"/>
+                                          </p:stCondLst>
+                                        </p:cTn>
+                                        <p:tgtEl>
+                                          <p:spTgt spid="9"/>
+                                        </p:tgtEl>
+                                      </p:cBhvr>
+                                      <p:to x="100000" y="100000"/>
+                                    </p:animScale>
+                                    <p:animScale>
+                                      <p:cBhvr>
+                                        <p:cTn id="113" dur="26">
+                                          <p:stCondLst>
+                                            <p:cond delay="1642"/>
+                                          </p:stCondLst>
+                                        </p:cTn>
+                                        <p:tgtEl>
+                                          <p:spTgt spid="9"/>
+                                        </p:tgtEl>
+                                      </p:cBhvr>
+                                      <p:to x="100000" y="90000"/>
+                                    </p:animScale>
+                                    <p:animScale>
+                                      <p:cBhvr>
+                                        <p:cTn id="114" dur="166" decel="50000">
+                                          <p:stCondLst>
+                                            <p:cond delay="1668"/>
+                                          </p:stCondLst>
+                                        </p:cTn>
+                                        <p:tgtEl>
+                                          <p:spTgt spid="9"/>
+                                        </p:tgtEl>
+                                      </p:cBhvr>
+                                      <p:to x="100000" y="100000"/>
+                                    </p:animScale>
+                                    <p:animScale>
+                                      <p:cBhvr>
+                                        <p:cTn id="115" dur="26">
+                                          <p:stCondLst>
+                                            <p:cond delay="1808"/>
+                                          </p:stCondLst>
+                                        </p:cTn>
+                                        <p:tgtEl>
+                                          <p:spTgt spid="9"/>
+                                        </p:tgtEl>
+                                      </p:cBhvr>
+                                      <p:to x="100000" y="95000"/>
+                                    </p:animScale>
+                                    <p:animScale>
+                                      <p:cBhvr>
+                                        <p:cTn id="116" dur="166" decel="50000">
+                                          <p:stCondLst>
+                                            <p:cond delay="1834"/>
+                                          </p:stCondLst>
+                                        </p:cTn>
+                                        <p:tgtEl>
+                                          <p:spTgt spid="9"/>
+                                        </p:tgtEl>
+                                      </p:cBhvr>
+                                      <p:to x="100000" y="100000"/>
+                                    </p:animScale>
+                                  </p:childTnLst>
+                                </p:cTn>
+                              </p:par>
+                              <p:par>
+                                <p:cTn id="117" presetID="26" presetClass="entr" presetSubtype="0" fill="hold" nodeType="withEffect">
+                                  <p:stCondLst>
+                                    <p:cond delay="0"/>
+                                  </p:stCondLst>
+                                  <p:childTnLst>
+                                    <p:set>
+                                      <p:cBhvr>
+                                        <p:cTn id="118" dur="1" fill="hold">
+                                          <p:stCondLst>
+                                            <p:cond delay="0"/>
+                                          </p:stCondLst>
+                                        </p:cTn>
+                                        <p:tgtEl>
+                                          <p:spTgt spid="12"/>
+                                        </p:tgtEl>
+                                        <p:attrNameLst>
+                                          <p:attrName>style.visibility</p:attrName>
+                                        </p:attrNameLst>
+                                      </p:cBhvr>
+                                      <p:to>
+                                        <p:strVal val="visible"/>
+                                      </p:to>
+                                    </p:set>
+                                    <p:animEffect transition="in" filter="wipe(down)">
+                                      <p:cBhvr>
+                                        <p:cTn id="119" dur="580">
+                                          <p:stCondLst>
+                                            <p:cond delay="0"/>
+                                          </p:stCondLst>
+                                        </p:cTn>
+                                        <p:tgtEl>
+                                          <p:spTgt spid="12"/>
+                                        </p:tgtEl>
+                                      </p:cBhvr>
+                                    </p:animEffect>
+                                    <p:anim calcmode="lin" valueType="num">
+                                      <p:cBhvr>
+                                        <p:cTn id="120" dur="1822" tmFilter="0,0; 0.14,0.36; 0.43,0.73; 0.71,0.91; 1.0,1.0">
+                                          <p:stCondLst>
+                                            <p:cond delay="0"/>
+                                          </p:stCondLst>
+                                        </p:cTn>
+                                        <p:tgtEl>
+                                          <p:spTgt spid="12"/>
+                                        </p:tgtEl>
+                                        <p:attrNameLst>
+                                          <p:attrName>ppt_x</p:attrName>
+                                        </p:attrNameLst>
+                                      </p:cBhvr>
+                                      <p:tavLst>
+                                        <p:tav tm="0">
+                                          <p:val>
+                                            <p:strVal val="#ppt_x-0.25"/>
+                                          </p:val>
+                                        </p:tav>
+                                        <p:tav tm="100000">
+                                          <p:val>
+                                            <p:strVal val="#ppt_x"/>
+                                          </p:val>
+                                        </p:tav>
+                                      </p:tavLst>
+                                    </p:anim>
+                                    <p:anim calcmode="lin" valueType="num">
+                                      <p:cBhvr>
+                                        <p:cTn id="121" dur="664" tmFilter="0.0,0.0; 0.25,0.07; 0.50,0.2; 0.75,0.467; 1.0,1.0">
+                                          <p:stCondLst>
+                                            <p:cond delay="0"/>
+                                          </p:stCondLst>
+                                        </p:cTn>
+                                        <p:tgtEl>
+                                          <p:spTgt spid="12"/>
+                                        </p:tgtEl>
+                                        <p:attrNameLst>
+                                          <p:attrName>ppt_y</p:attrName>
+                                        </p:attrNameLst>
+                                      </p:cBhvr>
+                                      <p:tavLst>
+                                        <p:tav tm="0" fmla="#ppt_y-sin(pi*$)/3">
+                                          <p:val>
+                                            <p:fltVal val="0.5"/>
+                                          </p:val>
+                                        </p:tav>
+                                        <p:tav tm="100000">
+                                          <p:val>
+                                            <p:fltVal val="1"/>
+                                          </p:val>
+                                        </p:tav>
+                                      </p:tavLst>
+                                    </p:anim>
+                                    <p:anim calcmode="lin" valueType="num">
+                                      <p:cBhvr>
+                                        <p:cTn id="122" dur="664" tmFilter="0, 0; 0.125,0.2665; 0.25,0.4; 0.375,0.465; 0.5,0.5;  0.625,0.535; 0.75,0.6; 0.875,0.7335; 1,1">
+                                          <p:stCondLst>
+                                            <p:cond delay="664"/>
+                                          </p:stCondLst>
+                                        </p:cTn>
+                                        <p:tgtEl>
+                                          <p:spTgt spid="12"/>
+                                        </p:tgtEl>
+                                        <p:attrNameLst>
+                                          <p:attrName>ppt_y</p:attrName>
+                                        </p:attrNameLst>
+                                      </p:cBhvr>
+                                      <p:tavLst>
+                                        <p:tav tm="0" fmla="#ppt_y-sin(pi*$)/9">
+                                          <p:val>
+                                            <p:fltVal val="0"/>
+                                          </p:val>
+                                        </p:tav>
+                                        <p:tav tm="100000">
+                                          <p:val>
+                                            <p:fltVal val="1"/>
+                                          </p:val>
+                                        </p:tav>
+                                      </p:tavLst>
+                                    </p:anim>
+                                    <p:anim calcmode="lin" valueType="num">
+                                      <p:cBhvr>
+                                        <p:cTn id="123" dur="332" tmFilter="0, 0; 0.125,0.2665; 0.25,0.4; 0.375,0.465; 0.5,0.5;  0.625,0.535; 0.75,0.6; 0.875,0.7335; 1,1">
+                                          <p:stCondLst>
+                                            <p:cond delay="1324"/>
+                                          </p:stCondLst>
+                                        </p:cTn>
+                                        <p:tgtEl>
+                                          <p:spTgt spid="12"/>
+                                        </p:tgtEl>
+                                        <p:attrNameLst>
+                                          <p:attrName>ppt_y</p:attrName>
+                                        </p:attrNameLst>
+                                      </p:cBhvr>
+                                      <p:tavLst>
+                                        <p:tav tm="0" fmla="#ppt_y-sin(pi*$)/27">
+                                          <p:val>
+                                            <p:fltVal val="0"/>
+                                          </p:val>
+                                        </p:tav>
+                                        <p:tav tm="100000">
+                                          <p:val>
+                                            <p:fltVal val="1"/>
+                                          </p:val>
+                                        </p:tav>
+                                      </p:tavLst>
+                                    </p:anim>
+                                    <p:anim calcmode="lin" valueType="num">
+                                      <p:cBhvr>
+                                        <p:cTn id="124" dur="164" tmFilter="0, 0; 0.125,0.2665; 0.25,0.4; 0.375,0.465; 0.5,0.5;  0.625,0.535; 0.75,0.6; 0.875,0.7335; 1,1">
+                                          <p:stCondLst>
+                                            <p:cond delay="1656"/>
+                                          </p:stCondLst>
+                                        </p:cTn>
+                                        <p:tgtEl>
+                                          <p:spTgt spid="12"/>
+                                        </p:tgtEl>
+                                        <p:attrNameLst>
+                                          <p:attrName>ppt_y</p:attrName>
+                                        </p:attrNameLst>
+                                      </p:cBhvr>
+                                      <p:tavLst>
+                                        <p:tav tm="0" fmla="#ppt_y-sin(pi*$)/81">
+                                          <p:val>
+                                            <p:fltVal val="0"/>
+                                          </p:val>
+                                        </p:tav>
+                                        <p:tav tm="100000">
+                                          <p:val>
+                                            <p:fltVal val="1"/>
+                                          </p:val>
+                                        </p:tav>
+                                      </p:tavLst>
+                                    </p:anim>
+                                    <p:animScale>
+                                      <p:cBhvr>
+                                        <p:cTn id="125" dur="26">
+                                          <p:stCondLst>
+                                            <p:cond delay="650"/>
+                                          </p:stCondLst>
+                                        </p:cTn>
+                                        <p:tgtEl>
+                                          <p:spTgt spid="12"/>
+                                        </p:tgtEl>
+                                      </p:cBhvr>
+                                      <p:to x="100000" y="60000"/>
+                                    </p:animScale>
+                                    <p:animScale>
+                                      <p:cBhvr>
+                                        <p:cTn id="126" dur="166" decel="50000">
+                                          <p:stCondLst>
+                                            <p:cond delay="676"/>
+                                          </p:stCondLst>
+                                        </p:cTn>
+                                        <p:tgtEl>
+                                          <p:spTgt spid="12"/>
+                                        </p:tgtEl>
+                                      </p:cBhvr>
+                                      <p:to x="100000" y="100000"/>
+                                    </p:animScale>
+                                    <p:animScale>
+                                      <p:cBhvr>
+                                        <p:cTn id="127" dur="26">
+                                          <p:stCondLst>
+                                            <p:cond delay="1312"/>
+                                          </p:stCondLst>
+                                        </p:cTn>
+                                        <p:tgtEl>
+                                          <p:spTgt spid="12"/>
+                                        </p:tgtEl>
+                                      </p:cBhvr>
+                                      <p:to x="100000" y="80000"/>
+                                    </p:animScale>
+                                    <p:animScale>
+                                      <p:cBhvr>
+                                        <p:cTn id="128" dur="166" decel="50000">
+                                          <p:stCondLst>
+                                            <p:cond delay="1338"/>
+                                          </p:stCondLst>
+                                        </p:cTn>
+                                        <p:tgtEl>
+                                          <p:spTgt spid="12"/>
+                                        </p:tgtEl>
+                                      </p:cBhvr>
+                                      <p:to x="100000" y="100000"/>
+                                    </p:animScale>
+                                    <p:animScale>
+                                      <p:cBhvr>
+                                        <p:cTn id="129" dur="26">
+                                          <p:stCondLst>
+                                            <p:cond delay="1642"/>
+                                          </p:stCondLst>
+                                        </p:cTn>
+                                        <p:tgtEl>
+                                          <p:spTgt spid="12"/>
+                                        </p:tgtEl>
+                                      </p:cBhvr>
+                                      <p:to x="100000" y="90000"/>
+                                    </p:animScale>
+                                    <p:animScale>
+                                      <p:cBhvr>
+                                        <p:cTn id="130" dur="166" decel="50000">
+                                          <p:stCondLst>
+                                            <p:cond delay="1668"/>
+                                          </p:stCondLst>
+                                        </p:cTn>
+                                        <p:tgtEl>
+                                          <p:spTgt spid="12"/>
+                                        </p:tgtEl>
+                                      </p:cBhvr>
+                                      <p:to x="100000" y="100000"/>
+                                    </p:animScale>
+                                    <p:animScale>
+                                      <p:cBhvr>
+                                        <p:cTn id="131" dur="26">
+                                          <p:stCondLst>
+                                            <p:cond delay="1808"/>
+                                          </p:stCondLst>
+                                        </p:cTn>
+                                        <p:tgtEl>
+                                          <p:spTgt spid="12"/>
+                                        </p:tgtEl>
+                                      </p:cBhvr>
+                                      <p:to x="100000" y="95000"/>
+                                    </p:animScale>
+                                    <p:animScale>
+                                      <p:cBhvr>
+                                        <p:cTn id="132" dur="166" decel="50000">
+                                          <p:stCondLst>
+                                            <p:cond delay="1834"/>
+                                          </p:stCondLst>
+                                        </p:cTn>
+                                        <p:tgtEl>
+                                          <p:spTgt spid="12"/>
+                                        </p:tgtEl>
+                                      </p:cBhvr>
+                                      <p:to x="100000" y="100000"/>
+                                    </p:animScale>
+                                  </p:childTnLst>
+                                </p:cTn>
+                              </p:par>
+                              <p:par>
+                                <p:cTn id="133" presetID="26" presetClass="entr" presetSubtype="0" fill="hold" nodeType="withEffect">
+                                  <p:stCondLst>
+                                    <p:cond delay="0"/>
+                                  </p:stCondLst>
+                                  <p:childTnLst>
+                                    <p:set>
+                                      <p:cBhvr>
+                                        <p:cTn id="134" dur="1" fill="hold">
+                                          <p:stCondLst>
+                                            <p:cond delay="0"/>
+                                          </p:stCondLst>
+                                        </p:cTn>
+                                        <p:tgtEl>
+                                          <p:spTgt spid="11"/>
+                                        </p:tgtEl>
+                                        <p:attrNameLst>
+                                          <p:attrName>style.visibility</p:attrName>
+                                        </p:attrNameLst>
+                                      </p:cBhvr>
+                                      <p:to>
+                                        <p:strVal val="visible"/>
+                                      </p:to>
+                                    </p:set>
+                                    <p:animEffect transition="in" filter="wipe(down)">
+                                      <p:cBhvr>
+                                        <p:cTn id="135" dur="580">
+                                          <p:stCondLst>
+                                            <p:cond delay="0"/>
+                                          </p:stCondLst>
+                                        </p:cTn>
+                                        <p:tgtEl>
+                                          <p:spTgt spid="11"/>
+                                        </p:tgtEl>
+                                      </p:cBhvr>
+                                    </p:animEffect>
+                                    <p:anim calcmode="lin" valueType="num">
+                                      <p:cBhvr>
+                                        <p:cTn id="136" dur="1822" tmFilter="0,0; 0.14,0.36; 0.43,0.73; 0.71,0.91; 1.0,1.0">
+                                          <p:stCondLst>
+                                            <p:cond delay="0"/>
+                                          </p:stCondLst>
+                                        </p:cTn>
+                                        <p:tgtEl>
+                                          <p:spTgt spid="11"/>
+                                        </p:tgtEl>
+                                        <p:attrNameLst>
+                                          <p:attrName>ppt_x</p:attrName>
+                                        </p:attrNameLst>
+                                      </p:cBhvr>
+                                      <p:tavLst>
+                                        <p:tav tm="0">
+                                          <p:val>
+                                            <p:strVal val="#ppt_x-0.25"/>
+                                          </p:val>
+                                        </p:tav>
+                                        <p:tav tm="100000">
+                                          <p:val>
+                                            <p:strVal val="#ppt_x"/>
+                                          </p:val>
+                                        </p:tav>
+                                      </p:tavLst>
+                                    </p:anim>
+                                    <p:anim calcmode="lin" valueType="num">
+                                      <p:cBhvr>
+                                        <p:cTn id="137" dur="664" tmFilter="0.0,0.0; 0.25,0.07; 0.50,0.2; 0.75,0.467; 1.0,1.0">
+                                          <p:stCondLst>
+                                            <p:cond delay="0"/>
+                                          </p:stCondLst>
+                                        </p:cTn>
+                                        <p:tgtEl>
+                                          <p:spTgt spid="11"/>
+                                        </p:tgtEl>
+                                        <p:attrNameLst>
+                                          <p:attrName>ppt_y</p:attrName>
+                                        </p:attrNameLst>
+                                      </p:cBhvr>
+                                      <p:tavLst>
+                                        <p:tav tm="0" fmla="#ppt_y-sin(pi*$)/3">
+                                          <p:val>
+                                            <p:fltVal val="0.5"/>
+                                          </p:val>
+                                        </p:tav>
+                                        <p:tav tm="100000">
+                                          <p:val>
+                                            <p:fltVal val="1"/>
+                                          </p:val>
+                                        </p:tav>
+                                      </p:tavLst>
+                                    </p:anim>
+                                    <p:anim calcmode="lin" valueType="num">
+                                      <p:cBhvr>
+                                        <p:cTn id="138" dur="664" tmFilter="0, 0; 0.125,0.2665; 0.25,0.4; 0.375,0.465; 0.5,0.5;  0.625,0.535; 0.75,0.6; 0.875,0.7335; 1,1">
+                                          <p:stCondLst>
+                                            <p:cond delay="664"/>
+                                          </p:stCondLst>
+                                        </p:cTn>
+                                        <p:tgtEl>
+                                          <p:spTgt spid="11"/>
+                                        </p:tgtEl>
+                                        <p:attrNameLst>
+                                          <p:attrName>ppt_y</p:attrName>
+                                        </p:attrNameLst>
+                                      </p:cBhvr>
+                                      <p:tavLst>
+                                        <p:tav tm="0" fmla="#ppt_y-sin(pi*$)/9">
+                                          <p:val>
+                                            <p:fltVal val="0"/>
+                                          </p:val>
+                                        </p:tav>
+                                        <p:tav tm="100000">
+                                          <p:val>
+                                            <p:fltVal val="1"/>
+                                          </p:val>
+                                        </p:tav>
+                                      </p:tavLst>
+                                    </p:anim>
+                                    <p:anim calcmode="lin" valueType="num">
+                                      <p:cBhvr>
+                                        <p:cTn id="139" dur="332" tmFilter="0, 0; 0.125,0.2665; 0.25,0.4; 0.375,0.465; 0.5,0.5;  0.625,0.535; 0.75,0.6; 0.875,0.7335; 1,1">
+                                          <p:stCondLst>
+                                            <p:cond delay="1324"/>
+                                          </p:stCondLst>
+                                        </p:cTn>
+                                        <p:tgtEl>
+                                          <p:spTgt spid="11"/>
+                                        </p:tgtEl>
+                                        <p:attrNameLst>
+                                          <p:attrName>ppt_y</p:attrName>
+                                        </p:attrNameLst>
+                                      </p:cBhvr>
+                                      <p:tavLst>
+                                        <p:tav tm="0" fmla="#ppt_y-sin(pi*$)/27">
+                                          <p:val>
+                                            <p:fltVal val="0"/>
+                                          </p:val>
+                                        </p:tav>
+                                        <p:tav tm="100000">
+                                          <p:val>
+                                            <p:fltVal val="1"/>
+                                          </p:val>
+                                        </p:tav>
+                                      </p:tavLst>
+                                    </p:anim>
+                                    <p:anim calcmode="lin" valueType="num">
+                                      <p:cBhvr>
+                                        <p:cTn id="140" dur="164" tmFilter="0, 0; 0.125,0.2665; 0.25,0.4; 0.375,0.465; 0.5,0.5;  0.625,0.535; 0.75,0.6; 0.875,0.7335; 1,1">
+                                          <p:stCondLst>
+                                            <p:cond delay="1656"/>
+                                          </p:stCondLst>
+                                        </p:cTn>
+                                        <p:tgtEl>
+                                          <p:spTgt spid="11"/>
+                                        </p:tgtEl>
+                                        <p:attrNameLst>
+                                          <p:attrName>ppt_y</p:attrName>
+                                        </p:attrNameLst>
+                                      </p:cBhvr>
+                                      <p:tavLst>
+                                        <p:tav tm="0" fmla="#ppt_y-sin(pi*$)/81">
+                                          <p:val>
+                                            <p:fltVal val="0"/>
+                                          </p:val>
+                                        </p:tav>
+                                        <p:tav tm="100000">
+                                          <p:val>
+                                            <p:fltVal val="1"/>
+                                          </p:val>
+                                        </p:tav>
+                                      </p:tavLst>
+                                    </p:anim>
+                                    <p:animScale>
+                                      <p:cBhvr>
+                                        <p:cTn id="141" dur="26">
+                                          <p:stCondLst>
+                                            <p:cond delay="650"/>
+                                          </p:stCondLst>
+                                        </p:cTn>
+                                        <p:tgtEl>
+                                          <p:spTgt spid="11"/>
+                                        </p:tgtEl>
+                                      </p:cBhvr>
+                                      <p:to x="100000" y="60000"/>
+                                    </p:animScale>
+                                    <p:animScale>
+                                      <p:cBhvr>
+                                        <p:cTn id="142" dur="166" decel="50000">
+                                          <p:stCondLst>
+                                            <p:cond delay="676"/>
+                                          </p:stCondLst>
+                                        </p:cTn>
+                                        <p:tgtEl>
+                                          <p:spTgt spid="11"/>
+                                        </p:tgtEl>
+                                      </p:cBhvr>
+                                      <p:to x="100000" y="100000"/>
+                                    </p:animScale>
+                                    <p:animScale>
+                                      <p:cBhvr>
+                                        <p:cTn id="143" dur="26">
+                                          <p:stCondLst>
+                                            <p:cond delay="1312"/>
+                                          </p:stCondLst>
+                                        </p:cTn>
+                                        <p:tgtEl>
+                                          <p:spTgt spid="11"/>
+                                        </p:tgtEl>
+                                      </p:cBhvr>
+                                      <p:to x="100000" y="80000"/>
+                                    </p:animScale>
+                                    <p:animScale>
+                                      <p:cBhvr>
+                                        <p:cTn id="144" dur="166" decel="50000">
+                                          <p:stCondLst>
+                                            <p:cond delay="1338"/>
+                                          </p:stCondLst>
+                                        </p:cTn>
+                                        <p:tgtEl>
+                                          <p:spTgt spid="11"/>
+                                        </p:tgtEl>
+                                      </p:cBhvr>
+                                      <p:to x="100000" y="100000"/>
+                                    </p:animScale>
+                                    <p:animScale>
+                                      <p:cBhvr>
+                                        <p:cTn id="145" dur="26">
+                                          <p:stCondLst>
+                                            <p:cond delay="1642"/>
+                                          </p:stCondLst>
+                                        </p:cTn>
+                                        <p:tgtEl>
+                                          <p:spTgt spid="11"/>
+                                        </p:tgtEl>
+                                      </p:cBhvr>
+                                      <p:to x="100000" y="90000"/>
+                                    </p:animScale>
+                                    <p:animScale>
+                                      <p:cBhvr>
+                                        <p:cTn id="146" dur="166" decel="50000">
+                                          <p:stCondLst>
+                                            <p:cond delay="1668"/>
+                                          </p:stCondLst>
+                                        </p:cTn>
+                                        <p:tgtEl>
+                                          <p:spTgt spid="11"/>
+                                        </p:tgtEl>
+                                      </p:cBhvr>
+                                      <p:to x="100000" y="100000"/>
+                                    </p:animScale>
+                                    <p:animScale>
+                                      <p:cBhvr>
+                                        <p:cTn id="147" dur="26">
+                                          <p:stCondLst>
+                                            <p:cond delay="1808"/>
+                                          </p:stCondLst>
+                                        </p:cTn>
+                                        <p:tgtEl>
+                                          <p:spTgt spid="11"/>
+                                        </p:tgtEl>
+                                      </p:cBhvr>
+                                      <p:to x="100000" y="95000"/>
+                                    </p:animScale>
+                                    <p:animScale>
+                                      <p:cBhvr>
+                                        <p:cTn id="148" dur="166" decel="50000">
+                                          <p:stCondLst>
+                                            <p:cond delay="1834"/>
+                                          </p:stCondLst>
+                                        </p:cTn>
+                                        <p:tgtEl>
+                                          <p:spTgt spid="11"/>
+                                        </p:tgtEl>
+                                      </p:cBhvr>
+                                      <p:to x="100000" y="100000"/>
+                                    </p:animScale>
+                                  </p:childTnLst>
+                                </p:cTn>
+                              </p:par>
+                              <p:par>
+                                <p:cTn id="149" presetID="26" presetClass="entr" presetSubtype="0" fill="hold" grpId="0" nodeType="withEffect">
+                                  <p:stCondLst>
+                                    <p:cond delay="0"/>
+                                  </p:stCondLst>
+                                  <p:childTnLst>
+                                    <p:set>
+                                      <p:cBhvr>
+                                        <p:cTn id="150" dur="1" fill="hold">
+                                          <p:stCondLst>
+                                            <p:cond delay="0"/>
+                                          </p:stCondLst>
+                                        </p:cTn>
+                                        <p:tgtEl>
+                                          <p:spTgt spid="16"/>
+                                        </p:tgtEl>
+                                        <p:attrNameLst>
+                                          <p:attrName>style.visibility</p:attrName>
+                                        </p:attrNameLst>
+                                      </p:cBhvr>
+                                      <p:to>
+                                        <p:strVal val="visible"/>
+                                      </p:to>
+                                    </p:set>
+                                    <p:animEffect transition="in" filter="wipe(down)">
+                                      <p:cBhvr>
+                                        <p:cTn id="151" dur="580">
+                                          <p:stCondLst>
+                                            <p:cond delay="0"/>
+                                          </p:stCondLst>
+                                        </p:cTn>
+                                        <p:tgtEl>
+                                          <p:spTgt spid="16"/>
+                                        </p:tgtEl>
+                                      </p:cBhvr>
+                                    </p:animEffect>
+                                    <p:anim calcmode="lin" valueType="num">
+                                      <p:cBhvr>
+                                        <p:cTn id="152" dur="1822" tmFilter="0,0; 0.14,0.36; 0.43,0.73; 0.71,0.91; 1.0,1.0">
+                                          <p:stCondLst>
+                                            <p:cond delay="0"/>
+                                          </p:stCondLst>
+                                        </p:cTn>
+                                        <p:tgtEl>
+                                          <p:spTgt spid="16"/>
+                                        </p:tgtEl>
+                                        <p:attrNameLst>
+                                          <p:attrName>ppt_x</p:attrName>
+                                        </p:attrNameLst>
+                                      </p:cBhvr>
+                                      <p:tavLst>
+                                        <p:tav tm="0">
+                                          <p:val>
+                                            <p:strVal val="#ppt_x-0.25"/>
+                                          </p:val>
+                                        </p:tav>
+                                        <p:tav tm="100000">
+                                          <p:val>
+                                            <p:strVal val="#ppt_x"/>
+                                          </p:val>
+                                        </p:tav>
+                                      </p:tavLst>
+                                    </p:anim>
+                                    <p:anim calcmode="lin" valueType="num">
+                                      <p:cBhvr>
+                                        <p:cTn id="153" dur="664" tmFilter="0.0,0.0; 0.25,0.07; 0.50,0.2; 0.75,0.467; 1.0,1.0">
+                                          <p:stCondLst>
+                                            <p:cond delay="0"/>
+                                          </p:stCondLst>
+                                        </p:cTn>
+                                        <p:tgtEl>
+                                          <p:spTgt spid="16"/>
+                                        </p:tgtEl>
+                                        <p:attrNameLst>
+                                          <p:attrName>ppt_y</p:attrName>
+                                        </p:attrNameLst>
+                                      </p:cBhvr>
+                                      <p:tavLst>
+                                        <p:tav tm="0" fmla="#ppt_y-sin(pi*$)/3">
+                                          <p:val>
+                                            <p:fltVal val="0.5"/>
+                                          </p:val>
+                                        </p:tav>
+                                        <p:tav tm="100000">
+                                          <p:val>
+                                            <p:fltVal val="1"/>
+                                          </p:val>
+                                        </p:tav>
+                                      </p:tavLst>
+                                    </p:anim>
+                                    <p:anim calcmode="lin" valueType="num">
+                                      <p:cBhvr>
+                                        <p:cTn id="154" dur="664" tmFilter="0, 0; 0.125,0.2665; 0.25,0.4; 0.375,0.465; 0.5,0.5;  0.625,0.535; 0.75,0.6; 0.875,0.7335; 1,1">
+                                          <p:stCondLst>
+                                            <p:cond delay="664"/>
+                                          </p:stCondLst>
+                                        </p:cTn>
+                                        <p:tgtEl>
+                                          <p:spTgt spid="16"/>
+                                        </p:tgtEl>
+                                        <p:attrNameLst>
+                                          <p:attrName>ppt_y</p:attrName>
+                                        </p:attrNameLst>
+                                      </p:cBhvr>
+                                      <p:tavLst>
+                                        <p:tav tm="0" fmla="#ppt_y-sin(pi*$)/9">
+                                          <p:val>
+                                            <p:fltVal val="0"/>
+                                          </p:val>
+                                        </p:tav>
+                                        <p:tav tm="100000">
+                                          <p:val>
+                                            <p:fltVal val="1"/>
+                                          </p:val>
+                                        </p:tav>
+                                      </p:tavLst>
+                                    </p:anim>
+                                    <p:anim calcmode="lin" valueType="num">
+                                      <p:cBhvr>
+                                        <p:cTn id="155" dur="332" tmFilter="0, 0; 0.125,0.2665; 0.25,0.4; 0.375,0.465; 0.5,0.5;  0.625,0.535; 0.75,0.6; 0.875,0.7335; 1,1">
+                                          <p:stCondLst>
+                                            <p:cond delay="1324"/>
+                                          </p:stCondLst>
+                                        </p:cTn>
+                                        <p:tgtEl>
+                                          <p:spTgt spid="16"/>
+                                        </p:tgtEl>
+                                        <p:attrNameLst>
+                                          <p:attrName>ppt_y</p:attrName>
+                                        </p:attrNameLst>
+                                      </p:cBhvr>
+                                      <p:tavLst>
+                                        <p:tav tm="0" fmla="#ppt_y-sin(pi*$)/27">
+                                          <p:val>
+                                            <p:fltVal val="0"/>
+                                          </p:val>
+                                        </p:tav>
+                                        <p:tav tm="100000">
+                                          <p:val>
+                                            <p:fltVal val="1"/>
+                                          </p:val>
+                                        </p:tav>
+                                      </p:tavLst>
+                                    </p:anim>
+                                    <p:anim calcmode="lin" valueType="num">
+                                      <p:cBhvr>
+                                        <p:cTn id="156" dur="164" tmFilter="0, 0; 0.125,0.2665; 0.25,0.4; 0.375,0.465; 0.5,0.5;  0.625,0.535; 0.75,0.6; 0.875,0.7335; 1,1">
+                                          <p:stCondLst>
+                                            <p:cond delay="1656"/>
+                                          </p:stCondLst>
+                                        </p:cTn>
+                                        <p:tgtEl>
+                                          <p:spTgt spid="16"/>
+                                        </p:tgtEl>
+                                        <p:attrNameLst>
+                                          <p:attrName>ppt_y</p:attrName>
+                                        </p:attrNameLst>
+                                      </p:cBhvr>
+                                      <p:tavLst>
+                                        <p:tav tm="0" fmla="#ppt_y-sin(pi*$)/81">
+                                          <p:val>
+                                            <p:fltVal val="0"/>
+                                          </p:val>
+                                        </p:tav>
+                                        <p:tav tm="100000">
+                                          <p:val>
+                                            <p:fltVal val="1"/>
+                                          </p:val>
+                                        </p:tav>
+                                      </p:tavLst>
+                                    </p:anim>
+                                    <p:animScale>
+                                      <p:cBhvr>
+                                        <p:cTn id="157" dur="26">
+                                          <p:stCondLst>
+                                            <p:cond delay="650"/>
+                                          </p:stCondLst>
+                                        </p:cTn>
+                                        <p:tgtEl>
+                                          <p:spTgt spid="16"/>
+                                        </p:tgtEl>
+                                      </p:cBhvr>
+                                      <p:to x="100000" y="60000"/>
+                                    </p:animScale>
+                                    <p:animScale>
+                                      <p:cBhvr>
+                                        <p:cTn id="158" dur="166" decel="50000">
+                                          <p:stCondLst>
+                                            <p:cond delay="676"/>
+                                          </p:stCondLst>
+                                        </p:cTn>
+                                        <p:tgtEl>
+                                          <p:spTgt spid="16"/>
+                                        </p:tgtEl>
+                                      </p:cBhvr>
+                                      <p:to x="100000" y="100000"/>
+                                    </p:animScale>
+                                    <p:animScale>
+                                      <p:cBhvr>
+                                        <p:cTn id="159" dur="26">
+                                          <p:stCondLst>
+                                            <p:cond delay="1312"/>
+                                          </p:stCondLst>
+                                        </p:cTn>
+                                        <p:tgtEl>
+                                          <p:spTgt spid="16"/>
+                                        </p:tgtEl>
+                                      </p:cBhvr>
+                                      <p:to x="100000" y="80000"/>
+                                    </p:animScale>
+                                    <p:animScale>
+                                      <p:cBhvr>
+                                        <p:cTn id="160" dur="166" decel="50000">
+                                          <p:stCondLst>
+                                            <p:cond delay="1338"/>
+                                          </p:stCondLst>
+                                        </p:cTn>
+                                        <p:tgtEl>
+                                          <p:spTgt spid="16"/>
+                                        </p:tgtEl>
+                                      </p:cBhvr>
+                                      <p:to x="100000" y="100000"/>
+                                    </p:animScale>
+                                    <p:animScale>
+                                      <p:cBhvr>
+                                        <p:cTn id="161" dur="26">
+                                          <p:stCondLst>
+                                            <p:cond delay="1642"/>
+                                          </p:stCondLst>
+                                        </p:cTn>
+                                        <p:tgtEl>
+                                          <p:spTgt spid="16"/>
+                                        </p:tgtEl>
+                                      </p:cBhvr>
+                                      <p:to x="100000" y="90000"/>
+                                    </p:animScale>
+                                    <p:animScale>
+                                      <p:cBhvr>
+                                        <p:cTn id="162" dur="166" decel="50000">
+                                          <p:stCondLst>
+                                            <p:cond delay="1668"/>
+                                          </p:stCondLst>
+                                        </p:cTn>
+                                        <p:tgtEl>
+                                          <p:spTgt spid="16"/>
+                                        </p:tgtEl>
+                                      </p:cBhvr>
+                                      <p:to x="100000" y="100000"/>
+                                    </p:animScale>
+                                    <p:animScale>
+                                      <p:cBhvr>
+                                        <p:cTn id="163" dur="26">
+                                          <p:stCondLst>
+                                            <p:cond delay="1808"/>
+                                          </p:stCondLst>
+                                        </p:cTn>
+                                        <p:tgtEl>
+                                          <p:spTgt spid="16"/>
+                                        </p:tgtEl>
+                                      </p:cBhvr>
+                                      <p:to x="100000" y="95000"/>
+                                    </p:animScale>
+                                    <p:animScale>
+                                      <p:cBhvr>
+                                        <p:cTn id="164" dur="166" decel="50000">
+                                          <p:stCondLst>
+                                            <p:cond delay="1834"/>
+                                          </p:stCondLst>
+                                        </p:cTn>
+                                        <p:tgtEl>
+                                          <p:spTgt spid="16"/>
+                                        </p:tgtEl>
+                                      </p:cBhvr>
+                                      <p:to x="100000" y="100000"/>
+                                    </p:animScale>
+                                  </p:childTnLst>
+                                </p:cTn>
+                              </p:par>
+                            </p:childTnLst>
+                          </p:cTn>
+                        </p:par>
+                      </p:childTnLst>
+                    </p:cTn>
+                  </p:par>
+                </p:childTnLst>
+              </p:cTn>
+              <p:prevCondLst>
+                <p:cond evt="onPrev" delay="0">
+                  <p:tgtEl>
+                    <p:sldTgt/>
+                  </p:tgtEl>
+                </p:cond>
+              </p:prevCondLst>
+              <p:nextCondLst>
+                <p:cond evt="onNext" delay="0">
+                  <p:tgtEl>
+                    <p:sldTgt/>
+                  </p:tgtEl>
+                </p:cond>
+              </p:nextCondLst>
+            </p:seq>
+          </p:childTnLst>
+        </p:cTn>
+      </p:par>
+    </p:tnLst>
+    <p:bldLst>
+      <p:bldP spid="16" grpId="0"/>
+    </p:bldLst>
+  </p:timing>
+</p:sld>
+</file>
+
+<file path=ppt/slides/slide8.xml><?xml version="1.0" encoding="utf-8"?>
+<p:sld xmlns:a="http://schemas.openxmlformats.org/drawingml/2006/main" xmlns:r="http://schemas.openxmlformats.org/officeDocument/2006/relationships" xmlns:p="http://schemas.openxmlformats.org/presentationml/2006/main">
+  <p:cSld>
+    <p:spTree>
+      <p:nvGrpSpPr>
+        <p:cNvPr id="1" name=""/>
+        <p:cNvGrpSpPr/>
+        <p:nvPr/>
+      </p:nvGrpSpPr>
+      <p:grpSpPr>
+        <a:xfrm>
+          <a:off x="0" y="0"/>
+          <a:ext cx="0" cy="0"/>
+          <a:chOff x="0" y="0"/>
+          <a:chExt cx="0" cy="0"/>
+        </a:xfrm>
+      </p:grpSpPr>
+      <p:sp>
+        <p:nvSpPr>
+          <p:cNvPr id="3" name="Tijdelijke aanduiding voor inhoud 2"/>
+          <p:cNvSpPr>
+            <a:spLocks noGrp="1"/>
+          </p:cNvSpPr>
+          <p:nvPr>
+            <p:ph idx="1"/>
+          </p:nvPr>
+        </p:nvSpPr>
+        <p:spPr>
+          <a:xfrm>
+            <a:off x="1763688" y="2492896"/>
+            <a:ext cx="5616624" cy="2736304"/>
+          </a:xfrm>
+        </p:spPr>
+        <p:txBody>
+          <a:bodyPr>
+            <a:normAutofit fontScale="85000" lnSpcReduction="10000"/>
+          </a:bodyPr>
+          <a:lstStyle/>
+          <a:p>
+            <a:r>
+              <a:rPr lang="nl-NL" dirty="0" smtClean="0"/>
+              <a:t>PHP kennis</a:t>
+            </a:r>
+          </a:p>
+          <a:p>
+            <a:r>
+              <a:rPr lang="nl-NL" dirty="0" err="1" smtClean="0"/>
+              <a:t>Frameworks</a:t>
+            </a:r>
+            <a:endParaRPr lang="nl-NL" dirty="0" smtClean="0"/>
+          </a:p>
+          <a:p>
+            <a:r>
+              <a:rPr lang="nl-NL" dirty="0" smtClean="0"/>
+              <a:t>LDAP connectie</a:t>
+            </a:r>
+          </a:p>
+          <a:p>
+            <a:r>
+              <a:rPr lang="nl-NL" dirty="0" smtClean="0"/>
+              <a:t>LDAP beveiliging</a:t>
+            </a:r>
+          </a:p>
+          <a:p>
+            <a:r>
+              <a:rPr lang="nl-NL" dirty="0" smtClean="0"/>
+              <a:t>Werkplek</a:t>
+            </a:r>
+          </a:p>
+          <a:p>
+            <a:r>
+              <a:rPr lang="nl-NL" dirty="0" smtClean="0"/>
+              <a:t>Samenwerking met project </a:t>
+            </a:r>
+            <a:r>
+              <a:rPr lang="nl-NL" dirty="0" err="1" smtClean="0"/>
+              <a:t>codebox</a:t>
+            </a:r>
+            <a:endParaRPr lang="nl-NL" dirty="0" smtClean="0"/>
+          </a:p>
+        </p:txBody>
+      </p:sp>
+      <p:pic>
+        <p:nvPicPr>
+          <p:cNvPr id="1027" name="Picture 3"/>
           <p:cNvPicPr>
             <a:picLocks noChangeAspect="1" noChangeArrowheads="1"/>
           </p:cNvPicPr>
           <p:nvPr/>
         </p:nvPicPr>
         <p:blipFill>
-          <a:blip r:embed="rId3">
+          <a:blip r:embed="rId2">
             <a:extLst>
               <a:ext uri="{28A0092B-C50C-407E-A947-70E740481C1C}">
                 <a14:useLocalDpi xmlns:a14="http://schemas.microsoft.com/office/drawing/2010/main" val="0"/>
@@ -4295,41 +7885,95 @@
         </p:blipFill>
         <p:spPr bwMode="auto">
           <a:xfrm>
-            <a:off x="2322859" y="2137568"/>
-            <a:ext cx="4786313" cy="3595688"/>
+            <a:off x="1" y="-27384"/>
+            <a:ext cx="9144000" cy="1143000"/>
           </a:xfrm>
           <a:prstGeom prst="rect">
             <a:avLst/>
           </a:prstGeom>
           <a:noFill/>
+          <a:ln>
+            <a:noFill/>
+          </a:ln>
           <a:extLst>
             <a:ext uri="{909E8E84-426E-40DD-AFC4-6F175D3DCCD1}">
               <a14:hiddenFill xmlns:a14="http://schemas.microsoft.com/office/drawing/2010/main">
                 <a:solidFill>
-                  <a:srgbClr val="FFFFFF"/>
+                  <a:schemeClr val="accent1"/>
                 </a:solidFill>
               </a14:hiddenFill>
+            </a:ext>
+            <a:ext uri="{91240B29-F687-4F45-9708-019B960494DF}">
+              <a14:hiddenLine xmlns:a14="http://schemas.microsoft.com/office/drawing/2010/main" w="9525">
+                <a:solidFill>
+                  <a:schemeClr val="tx1"/>
+                </a:solidFill>
+                <a:miter lim="800000"/>
+                <a:headEnd/>
+                <a:tailEnd/>
+              </a14:hiddenLine>
             </a:ext>
           </a:extLst>
         </p:spPr>
       </p:pic>
+      <p:sp>
+        <p:nvSpPr>
+          <p:cNvPr id="5" name="Tekstvak 4"/>
+          <p:cNvSpPr txBox="1"/>
+          <p:nvPr/>
+        </p:nvSpPr>
+        <p:spPr>
+          <a:xfrm>
+            <a:off x="2411760" y="476672"/>
+            <a:ext cx="4608512" cy="369332"/>
+          </a:xfrm>
+          <a:prstGeom prst="rect">
+            <a:avLst/>
+          </a:prstGeom>
+          <a:noFill/>
+        </p:spPr>
+        <p:txBody>
+          <a:bodyPr wrap="square" rtlCol="0">
+            <a:spAutoFit/>
+          </a:bodyPr>
+          <a:lstStyle/>
+          <a:p>
+            <a:pPr algn="ctr"/>
+            <a:r>
+              <a:rPr lang="nl-NL" dirty="0" smtClean="0">
+                <a:solidFill>
+                  <a:schemeClr val="bg1"/>
+                </a:solidFill>
+                <a:latin typeface="Eras Bold ITC" pitchFamily="34" charset="0"/>
+              </a:rPr>
+              <a:t>Problemen en oplossingen</a:t>
+            </a:r>
+            <a:endParaRPr lang="nl-NL" dirty="0">
+              <a:solidFill>
+                <a:schemeClr val="bg1"/>
+              </a:solidFill>
+              <a:latin typeface="Eras Bold ITC" pitchFamily="34" charset="0"/>
+            </a:endParaRPr>
+          </a:p>
+        </p:txBody>
+      </p:sp>
     </p:spTree>
     <p:extLst>
       <p:ext uri="{BB962C8B-B14F-4D97-AF65-F5344CB8AC3E}">
-        <p14:creationId xmlns:p14="http://schemas.microsoft.com/office/powerpoint/2010/main" val="1513749742"/>
+        <p14:creationId xmlns:p14="http://schemas.microsoft.com/office/powerpoint/2010/main" val="1732063340"/>
       </p:ext>
     </p:extLst>
   </p:cSld>
   <p:clrMapOvr>
     <a:masterClrMapping/>
   </p:clrMapOvr>
-  <mc:AlternateContent xmlns:mc="http://schemas.openxmlformats.org/markup-compatibility/2006">
-    <mc:Choice xmlns:p14="http://schemas.microsoft.com/office/powerpoint/2010/main" Requires="p14">
+  <mc:AlternateContent xmlns:mc="http://schemas.openxmlformats.org/markup-compatibility/2006" xmlns:p14="http://schemas.microsoft.com/office/powerpoint/2010/main">
+    <mc:Choice Requires="p14">
       <p:transition spd="slow" p14:dur="800">
         <p14:flythrough/>
       </p:transition>
     </mc:Choice>
-    <mc:Fallback>
+    <mc:Fallback xmlns="">
       <p:transition spd="slow">
         <p:fade/>
       </p:transition>
@@ -4345,7 +7989,7 @@
 </p:sld>
 </file>
 
-<file path=ppt/slides/slide8.xml><?xml version="1.0" encoding="utf-8"?>
+<file path=ppt/slides/slide9.xml><?xml version="1.0" encoding="utf-8"?>
 <p:sld xmlns:a="http://schemas.openxmlformats.org/drawingml/2006/main" xmlns:r="http://schemas.openxmlformats.org/officeDocument/2006/relationships" xmlns:p="http://schemas.openxmlformats.org/presentationml/2006/main">
   <p:cSld>
     <p:spTree>
@@ -4446,7 +8090,7 @@
                 </a:solidFill>
                 <a:latin typeface="Eras Bold ITC" pitchFamily="34" charset="0"/>
               </a:rPr>
-              <a:t>Demonstratie</a:t>
+              <a:t>Conclusie</a:t>
             </a:r>
             <a:endParaRPr lang="nl-NL" dirty="0">
               <a:solidFill>
@@ -4457,62 +8101,64 @@
           </a:p>
         </p:txBody>
       </p:sp>
-      <p:sp>
-        <p:nvSpPr>
-          <p:cNvPr id="2" name="Tekstvak 1"/>
-          <p:cNvSpPr txBox="1"/>
+      <p:pic>
+        <p:nvPicPr>
+          <p:cNvPr id="5122" name="Picture 2" descr="http://smallbiztrends.com/wp-content/uploads/2010/10/true-false2.jpg"/>
+          <p:cNvPicPr>
+            <a:picLocks noChangeAspect="1" noChangeArrowheads="1"/>
+          </p:cNvPicPr>
           <p:nvPr/>
-        </p:nvSpPr>
-        <p:spPr>
+        </p:nvPicPr>
+        <p:blipFill>
+          <a:blip r:embed="rId3">
+            <a:extLst>
+              <a:ext uri="{28A0092B-C50C-407E-A947-70E740481C1C}">
+                <a14:useLocalDpi xmlns:a14="http://schemas.microsoft.com/office/drawing/2010/main" val="0"/>
+              </a:ext>
+            </a:extLst>
+          </a:blip>
+          <a:srcRect/>
+          <a:stretch>
+            <a:fillRect/>
+          </a:stretch>
+        </p:blipFill>
+        <p:spPr bwMode="auto">
           <a:xfrm>
-            <a:off x="1223628" y="3068960"/>
-            <a:ext cx="6984776" cy="707886"/>
+            <a:off x="2322859" y="2137568"/>
+            <a:ext cx="4786313" cy="3595688"/>
           </a:xfrm>
           <a:prstGeom prst="rect">
             <a:avLst/>
           </a:prstGeom>
           <a:noFill/>
+          <a:extLst>
+            <a:ext uri="{909E8E84-426E-40DD-AFC4-6F175D3DCCD1}">
+              <a14:hiddenFill xmlns:a14="http://schemas.microsoft.com/office/drawing/2010/main">
+                <a:solidFill>
+                  <a:srgbClr val="FFFFFF"/>
+                </a:solidFill>
+              </a14:hiddenFill>
+            </a:ext>
+          </a:extLst>
         </p:spPr>
-        <p:txBody>
-          <a:bodyPr wrap="square" rtlCol="0">
-            <a:spAutoFit/>
-          </a:bodyPr>
-          <a:lstStyle/>
-          <a:p>
-            <a:pPr algn="ctr"/>
-            <a:r>
-              <a:rPr lang="nl-NL" sz="4000" dirty="0">
-                <a:hlinkClick r:id="rId3"/>
-              </a:rPr>
-              <a:t>http://</a:t>
-            </a:r>
-            <a:r>
-              <a:rPr lang="nl-NL" sz="4000" dirty="0" smtClean="0">
-                <a:hlinkClick r:id="rId3"/>
-              </a:rPr>
-              <a:t>subscribeme.tech.nhl.nl</a:t>
-            </a:r>
-            <a:endParaRPr lang="nl-NL" sz="4000" dirty="0"/>
-          </a:p>
-        </p:txBody>
-      </p:sp>
+      </p:pic>
     </p:spTree>
     <p:extLst>
       <p:ext uri="{BB962C8B-B14F-4D97-AF65-F5344CB8AC3E}">
-        <p14:creationId xmlns:p14="http://schemas.microsoft.com/office/powerpoint/2010/main" val="4241157190"/>
+        <p14:creationId xmlns:p14="http://schemas.microsoft.com/office/powerpoint/2010/main" val="1513749742"/>
       </p:ext>
     </p:extLst>
   </p:cSld>
   <p:clrMapOvr>
     <a:masterClrMapping/>
   </p:clrMapOvr>
-  <mc:AlternateContent xmlns:mc="http://schemas.openxmlformats.org/markup-compatibility/2006">
-    <mc:Choice xmlns:p14="http://schemas.microsoft.com/office/powerpoint/2010/main" Requires="p14">
+  <mc:AlternateContent xmlns:mc="http://schemas.openxmlformats.org/markup-compatibility/2006" xmlns:p14="http://schemas.microsoft.com/office/powerpoint/2010/main">
+    <mc:Choice Requires="p14">
       <p:transition spd="slow" p14:dur="800">
         <p14:flythrough/>
       </p:transition>
     </mc:Choice>
-    <mc:Fallback>
+    <mc:Fallback xmlns="">
       <p:transition spd="slow">
         <p:fade/>
       </p:transition>

</xml_diff>